<commit_message>
updated ppt layout and slide master
</commit_message>
<xml_diff>
--- a/PowerPoint/ARTS-Lab_UofSC_slide_template.pptx
+++ b/PowerPoint/ARTS-Lab_UofSC_slide_template.pptx
@@ -6,18 +6,15 @@
     <p:sldMasterId id="2147483674" r:id="rId2"/>
   </p:sldMasterIdLst>
   <p:notesMasterIdLst>
-    <p:notesMasterId r:id="rId9"/>
+    <p:notesMasterId r:id="rId6"/>
   </p:notesMasterIdLst>
   <p:handoutMasterIdLst>
-    <p:handoutMasterId r:id="rId10"/>
+    <p:handoutMasterId r:id="rId7"/>
   </p:handoutMasterIdLst>
   <p:sldIdLst>
     <p:sldId id="293" r:id="rId3"/>
     <p:sldId id="271" r:id="rId4"/>
-    <p:sldId id="288" r:id="rId5"/>
-    <p:sldId id="292" r:id="rId6"/>
-    <p:sldId id="294" r:id="rId7"/>
-    <p:sldId id="284" r:id="rId8"/>
+    <p:sldId id="284" r:id="rId5"/>
   </p:sldIdLst>
   <p:sldSz cx="12192000" cy="6858000"/>
   <p:notesSz cx="7772400" cy="10058400"/>
@@ -218,7 +215,7 @@
           <a:p>
             <a:fld id="{365356D5-496E-4601-9467-AF85FBC5BAC0}" type="datetimeFigureOut">
               <a:rPr lang="en-US" smtClean="0"/>
-              <a:t>10/13/2021</a:t>
+              <a:t>4/24/2022</a:t>
             </a:fld>
             <a:endParaRPr lang="en-US"/>
           </a:p>
@@ -396,7 +393,7 @@
           <a:p>
             <a:fld id="{B6A3149F-C306-4332-9D1F-95BC64FEBABD}" type="datetimeFigureOut">
               <a:rPr lang="en-US" smtClean="0"/>
-              <a:t>10/13/2021</a:t>
+              <a:t>4/24/2022</a:t>
             </a:fld>
             <a:endParaRPr lang="en-US"/>
           </a:p>
@@ -930,7 +927,7 @@
 </file>
 
 <file path=ppt/slideLayouts/slideLayout1.xml><?xml version="1.0" encoding="utf-8"?>
-<p:sldLayout xmlns:a="http://schemas.openxmlformats.org/drawingml/2006/main" xmlns:r="http://schemas.openxmlformats.org/officeDocument/2006/relationships" xmlns:p="http://schemas.openxmlformats.org/presentationml/2006/main" type="blank">
+<p:sldLayout xmlns:a="http://schemas.openxmlformats.org/drawingml/2006/main" xmlns:r="http://schemas.openxmlformats.org/officeDocument/2006/relationships" xmlns:p="http://schemas.openxmlformats.org/presentationml/2006/main" userDrawn="1">
   <p:cSld name="Blank Slide">
     <p:spTree>
       <p:nvGrpSpPr>
@@ -946,6 +943,210 @@
           <a:chExt cx="0" cy="0"/>
         </a:xfrm>
       </p:grpSpPr>
+      <p:sp>
+        <p:nvSpPr>
+          <p:cNvPr id="2" name="PlaceHolder 1">
+            <a:extLst>
+              <a:ext uri="{FF2B5EF4-FFF2-40B4-BE49-F238E27FC236}">
+                <a16:creationId xmlns:a16="http://schemas.microsoft.com/office/drawing/2014/main" id="{3B810671-1097-4C07-9107-0E4DA6395EAF}"/>
+              </a:ext>
+            </a:extLst>
+          </p:cNvPr>
+          <p:cNvSpPr>
+            <a:spLocks noGrp="1"/>
+          </p:cNvSpPr>
+          <p:nvPr>
+            <p:ph type="title"/>
+          </p:nvPr>
+        </p:nvSpPr>
+        <p:spPr>
+          <a:xfrm>
+            <a:off x="609780" y="346172"/>
+            <a:ext cx="10972440" cy="1144800"/>
+          </a:xfrm>
+          <a:prstGeom prst="rect">
+            <a:avLst/>
+          </a:prstGeom>
+        </p:spPr>
+        <p:txBody>
+          <a:bodyPr lIns="0" tIns="0" rIns="0" bIns="0" anchor="ctr"/>
+          <a:lstStyle/>
+          <a:p>
+            <a:pPr algn="ctr"/>
+            <a:r>
+              <a:rPr lang="en-US" sz="4400" b="0" strike="noStrike" spc="-1" dirty="0">
+                <a:latin typeface="Arial"/>
+              </a:rPr>
+              <a:t>Click to edit the title text format</a:t>
+            </a:r>
+          </a:p>
+        </p:txBody>
+      </p:sp>
+      <p:sp>
+        <p:nvSpPr>
+          <p:cNvPr id="3" name="PlaceHolder 2">
+            <a:extLst>
+              <a:ext uri="{FF2B5EF4-FFF2-40B4-BE49-F238E27FC236}">
+                <a16:creationId xmlns:a16="http://schemas.microsoft.com/office/drawing/2014/main" id="{C02CB330-1EB7-4C3F-9A9F-235CFE68BDE3}"/>
+              </a:ext>
+            </a:extLst>
+          </p:cNvPr>
+          <p:cNvSpPr>
+            <a:spLocks noGrp="1"/>
+          </p:cNvSpPr>
+          <p:nvPr>
+            <p:ph idx="10"/>
+          </p:nvPr>
+        </p:nvSpPr>
+        <p:spPr>
+          <a:xfrm>
+            <a:off x="609780" y="1677092"/>
+            <a:ext cx="10972440" cy="3977280"/>
+          </a:xfrm>
+          <a:prstGeom prst="rect">
+            <a:avLst/>
+          </a:prstGeom>
+        </p:spPr>
+        <p:txBody>
+          <a:bodyPr lIns="0" tIns="0" rIns="0" bIns="0">
+            <a:normAutofit/>
+          </a:bodyPr>
+          <a:lstStyle/>
+          <a:p>
+            <a:pPr marL="432000" indent="-324000">
+              <a:spcBef>
+                <a:spcPts val="1417"/>
+              </a:spcBef>
+              <a:buClr>
+                <a:srgbClr val="000000"/>
+              </a:buClr>
+              <a:buSzPct val="45000"/>
+              <a:buFont typeface="Wingdings" charset="2"/>
+              <a:buChar char=""/>
+            </a:pPr>
+            <a:r>
+              <a:rPr lang="en-US" sz="3200" b="0" strike="noStrike" spc="-1" dirty="0">
+                <a:latin typeface="Arial"/>
+              </a:rPr>
+              <a:t>Click to edit the outline text format</a:t>
+            </a:r>
+          </a:p>
+          <a:p>
+            <a:pPr marL="864000" lvl="1" indent="-324000">
+              <a:spcBef>
+                <a:spcPts val="1134"/>
+              </a:spcBef>
+              <a:buClr>
+                <a:srgbClr val="000000"/>
+              </a:buClr>
+              <a:buSzPct val="75000"/>
+              <a:buFont typeface="Symbol" charset="2"/>
+              <a:buChar char=""/>
+            </a:pPr>
+            <a:r>
+              <a:rPr lang="en-US" sz="2800" b="0" strike="noStrike" spc="-1" dirty="0">
+                <a:latin typeface="Arial"/>
+              </a:rPr>
+              <a:t>Second Outline Level</a:t>
+            </a:r>
+          </a:p>
+          <a:p>
+            <a:pPr marL="1296000" lvl="2" indent="-288000">
+              <a:spcBef>
+                <a:spcPts val="850"/>
+              </a:spcBef>
+              <a:buClr>
+                <a:srgbClr val="000000"/>
+              </a:buClr>
+              <a:buSzPct val="45000"/>
+              <a:buFont typeface="Wingdings" charset="2"/>
+              <a:buChar char=""/>
+            </a:pPr>
+            <a:r>
+              <a:rPr lang="en-US" sz="2400" b="0" strike="noStrike" spc="-1" dirty="0">
+                <a:latin typeface="Arial"/>
+              </a:rPr>
+              <a:t>Third Outline Level</a:t>
+            </a:r>
+          </a:p>
+          <a:p>
+            <a:pPr marL="1728000" lvl="3" indent="-216000">
+              <a:spcBef>
+                <a:spcPts val="567"/>
+              </a:spcBef>
+              <a:buClr>
+                <a:srgbClr val="000000"/>
+              </a:buClr>
+              <a:buSzPct val="75000"/>
+              <a:buFont typeface="Symbol" charset="2"/>
+              <a:buChar char=""/>
+            </a:pPr>
+            <a:r>
+              <a:rPr lang="en-US" sz="2000" b="0" strike="noStrike" spc="-1" dirty="0">
+                <a:latin typeface="Arial"/>
+              </a:rPr>
+              <a:t>Fourth Outline Level</a:t>
+            </a:r>
+          </a:p>
+          <a:p>
+            <a:pPr marL="2160000" lvl="4" indent="-216000">
+              <a:spcBef>
+                <a:spcPts val="283"/>
+              </a:spcBef>
+              <a:buClr>
+                <a:srgbClr val="000000"/>
+              </a:buClr>
+              <a:buSzPct val="45000"/>
+              <a:buFont typeface="Wingdings" charset="2"/>
+              <a:buChar char=""/>
+            </a:pPr>
+            <a:r>
+              <a:rPr lang="en-US" sz="2000" b="0" strike="noStrike" spc="-1" dirty="0">
+                <a:latin typeface="Arial"/>
+              </a:rPr>
+              <a:t>Fifth Outline Level</a:t>
+            </a:r>
+          </a:p>
+          <a:p>
+            <a:pPr marL="2592000" lvl="5" indent="-216000">
+              <a:spcBef>
+                <a:spcPts val="283"/>
+              </a:spcBef>
+              <a:buClr>
+                <a:srgbClr val="000000"/>
+              </a:buClr>
+              <a:buSzPct val="45000"/>
+              <a:buFont typeface="Wingdings" charset="2"/>
+              <a:buChar char=""/>
+            </a:pPr>
+            <a:r>
+              <a:rPr lang="en-US" sz="2000" b="0" strike="noStrike" spc="-1" dirty="0">
+                <a:latin typeface="Arial"/>
+              </a:rPr>
+              <a:t>Sixth Outline Level</a:t>
+            </a:r>
+          </a:p>
+          <a:p>
+            <a:pPr marL="3024000" lvl="6" indent="-216000">
+              <a:spcBef>
+                <a:spcPts val="283"/>
+              </a:spcBef>
+              <a:buClr>
+                <a:srgbClr val="000000"/>
+              </a:buClr>
+              <a:buSzPct val="45000"/>
+              <a:buFont typeface="Wingdings" charset="2"/>
+              <a:buChar char=""/>
+            </a:pPr>
+            <a:r>
+              <a:rPr lang="en-US" sz="2000" b="0" strike="noStrike" spc="-1" dirty="0">
+                <a:latin typeface="Arial"/>
+              </a:rPr>
+              <a:t>Seventh Outline Level</a:t>
+            </a:r>
+          </a:p>
+        </p:txBody>
+      </p:sp>
     </p:spTree>
     <p:extLst>
       <p:ext uri="{BB962C8B-B14F-4D97-AF65-F5344CB8AC3E}">
@@ -960,6 +1161,405 @@
 </file>
 
 <file path=ppt/slideLayouts/slideLayout2.xml><?xml version="1.0" encoding="utf-8"?>
+<p:sldLayout xmlns:a="http://schemas.openxmlformats.org/drawingml/2006/main" xmlns:r="http://schemas.openxmlformats.org/officeDocument/2006/relationships" xmlns:p="http://schemas.openxmlformats.org/presentationml/2006/main" preserve="1" userDrawn="1">
+  <p:cSld name="1_Blank Slide">
+    <p:spTree>
+      <p:nvGrpSpPr>
+        <p:cNvPr id="1" name=""/>
+        <p:cNvGrpSpPr/>
+        <p:nvPr/>
+      </p:nvGrpSpPr>
+      <p:grpSpPr>
+        <a:xfrm>
+          <a:off x="0" y="0"/>
+          <a:ext cx="0" cy="0"/>
+          <a:chOff x="0" y="0"/>
+          <a:chExt cx="0" cy="0"/>
+        </a:xfrm>
+      </p:grpSpPr>
+      <p:sp>
+        <p:nvSpPr>
+          <p:cNvPr id="2" name="PlaceHolder 1">
+            <a:extLst>
+              <a:ext uri="{FF2B5EF4-FFF2-40B4-BE49-F238E27FC236}">
+                <a16:creationId xmlns:a16="http://schemas.microsoft.com/office/drawing/2014/main" id="{3B810671-1097-4C07-9107-0E4DA6395EAF}"/>
+              </a:ext>
+            </a:extLst>
+          </p:cNvPr>
+          <p:cNvSpPr>
+            <a:spLocks noGrp="1"/>
+          </p:cNvSpPr>
+          <p:nvPr>
+            <p:ph type="title"/>
+          </p:nvPr>
+        </p:nvSpPr>
+        <p:spPr>
+          <a:xfrm>
+            <a:off x="609780" y="346172"/>
+            <a:ext cx="10972440" cy="1144800"/>
+          </a:xfrm>
+          <a:prstGeom prst="rect">
+            <a:avLst/>
+          </a:prstGeom>
+        </p:spPr>
+        <p:txBody>
+          <a:bodyPr lIns="0" tIns="0" rIns="0" bIns="0" anchor="ctr"/>
+          <a:lstStyle/>
+          <a:p>
+            <a:pPr algn="ctr"/>
+            <a:r>
+              <a:rPr lang="en-US" sz="4400" b="0" strike="noStrike" spc="-1" dirty="0">
+                <a:latin typeface="Arial"/>
+              </a:rPr>
+              <a:t>Click to edit the title text format</a:t>
+            </a:r>
+          </a:p>
+        </p:txBody>
+      </p:sp>
+      <p:sp>
+        <p:nvSpPr>
+          <p:cNvPr id="3" name="PlaceHolder 2">
+            <a:extLst>
+              <a:ext uri="{FF2B5EF4-FFF2-40B4-BE49-F238E27FC236}">
+                <a16:creationId xmlns:a16="http://schemas.microsoft.com/office/drawing/2014/main" id="{C02CB330-1EB7-4C3F-9A9F-235CFE68BDE3}"/>
+              </a:ext>
+            </a:extLst>
+          </p:cNvPr>
+          <p:cNvSpPr>
+            <a:spLocks noGrp="1"/>
+          </p:cNvSpPr>
+          <p:nvPr>
+            <p:ph idx="10"/>
+          </p:nvPr>
+        </p:nvSpPr>
+        <p:spPr>
+          <a:xfrm>
+            <a:off x="609780" y="1677092"/>
+            <a:ext cx="5123363" cy="3977280"/>
+          </a:xfrm>
+          <a:prstGeom prst="rect">
+            <a:avLst/>
+          </a:prstGeom>
+        </p:spPr>
+        <p:txBody>
+          <a:bodyPr lIns="0" tIns="0" rIns="0" bIns="0">
+            <a:normAutofit/>
+          </a:bodyPr>
+          <a:lstStyle/>
+          <a:p>
+            <a:pPr marL="432000" indent="-324000">
+              <a:spcBef>
+                <a:spcPts val="1417"/>
+              </a:spcBef>
+              <a:buClr>
+                <a:srgbClr val="000000"/>
+              </a:buClr>
+              <a:buSzPct val="45000"/>
+              <a:buFont typeface="Wingdings" charset="2"/>
+              <a:buChar char=""/>
+            </a:pPr>
+            <a:r>
+              <a:rPr lang="en-US" sz="3200" b="0" strike="noStrike" spc="-1" dirty="0">
+                <a:latin typeface="Arial"/>
+              </a:rPr>
+              <a:t>Click to edit the outline text format</a:t>
+            </a:r>
+          </a:p>
+          <a:p>
+            <a:pPr marL="864000" lvl="1" indent="-324000">
+              <a:spcBef>
+                <a:spcPts val="1134"/>
+              </a:spcBef>
+              <a:buClr>
+                <a:srgbClr val="000000"/>
+              </a:buClr>
+              <a:buSzPct val="75000"/>
+              <a:buFont typeface="Symbol" charset="2"/>
+              <a:buChar char=""/>
+            </a:pPr>
+            <a:r>
+              <a:rPr lang="en-US" sz="2800" b="0" strike="noStrike" spc="-1" dirty="0">
+                <a:latin typeface="Arial"/>
+              </a:rPr>
+              <a:t>Second Outline Level</a:t>
+            </a:r>
+          </a:p>
+          <a:p>
+            <a:pPr marL="1296000" lvl="2" indent="-288000">
+              <a:spcBef>
+                <a:spcPts val="850"/>
+              </a:spcBef>
+              <a:buClr>
+                <a:srgbClr val="000000"/>
+              </a:buClr>
+              <a:buSzPct val="45000"/>
+              <a:buFont typeface="Wingdings" charset="2"/>
+              <a:buChar char=""/>
+            </a:pPr>
+            <a:r>
+              <a:rPr lang="en-US" sz="2400" b="0" strike="noStrike" spc="-1" dirty="0">
+                <a:latin typeface="Arial"/>
+              </a:rPr>
+              <a:t>Third Outline Level</a:t>
+            </a:r>
+          </a:p>
+          <a:p>
+            <a:pPr marL="1728000" lvl="3" indent="-216000">
+              <a:spcBef>
+                <a:spcPts val="567"/>
+              </a:spcBef>
+              <a:buClr>
+                <a:srgbClr val="000000"/>
+              </a:buClr>
+              <a:buSzPct val="75000"/>
+              <a:buFont typeface="Symbol" charset="2"/>
+              <a:buChar char=""/>
+            </a:pPr>
+            <a:r>
+              <a:rPr lang="en-US" sz="2000" b="0" strike="noStrike" spc="-1" dirty="0">
+                <a:latin typeface="Arial"/>
+              </a:rPr>
+              <a:t>Fourth Outline Level</a:t>
+            </a:r>
+          </a:p>
+          <a:p>
+            <a:pPr marL="2160000" lvl="4" indent="-216000">
+              <a:spcBef>
+                <a:spcPts val="283"/>
+              </a:spcBef>
+              <a:buClr>
+                <a:srgbClr val="000000"/>
+              </a:buClr>
+              <a:buSzPct val="45000"/>
+              <a:buFont typeface="Wingdings" charset="2"/>
+              <a:buChar char=""/>
+            </a:pPr>
+            <a:r>
+              <a:rPr lang="en-US" sz="2000" b="0" strike="noStrike" spc="-1" dirty="0">
+                <a:latin typeface="Arial"/>
+              </a:rPr>
+              <a:t>Fifth Outline Level</a:t>
+            </a:r>
+          </a:p>
+          <a:p>
+            <a:pPr marL="2592000" lvl="5" indent="-216000">
+              <a:spcBef>
+                <a:spcPts val="283"/>
+              </a:spcBef>
+              <a:buClr>
+                <a:srgbClr val="000000"/>
+              </a:buClr>
+              <a:buSzPct val="45000"/>
+              <a:buFont typeface="Wingdings" charset="2"/>
+              <a:buChar char=""/>
+            </a:pPr>
+            <a:r>
+              <a:rPr lang="en-US" sz="2000" b="0" strike="noStrike" spc="-1" dirty="0">
+                <a:latin typeface="Arial"/>
+              </a:rPr>
+              <a:t>Sixth Outline Level</a:t>
+            </a:r>
+          </a:p>
+          <a:p>
+            <a:pPr marL="3024000" lvl="6" indent="-216000">
+              <a:spcBef>
+                <a:spcPts val="283"/>
+              </a:spcBef>
+              <a:buClr>
+                <a:srgbClr val="000000"/>
+              </a:buClr>
+              <a:buSzPct val="45000"/>
+              <a:buFont typeface="Wingdings" charset="2"/>
+              <a:buChar char=""/>
+            </a:pPr>
+            <a:r>
+              <a:rPr lang="en-US" sz="2000" b="0" strike="noStrike" spc="-1" dirty="0">
+                <a:latin typeface="Arial"/>
+              </a:rPr>
+              <a:t>Seventh Outline Level</a:t>
+            </a:r>
+          </a:p>
+        </p:txBody>
+      </p:sp>
+      <p:sp>
+        <p:nvSpPr>
+          <p:cNvPr id="4" name="PlaceHolder 2">
+            <a:extLst>
+              <a:ext uri="{FF2B5EF4-FFF2-40B4-BE49-F238E27FC236}">
+                <a16:creationId xmlns:a16="http://schemas.microsoft.com/office/drawing/2014/main" id="{5921B1FE-DD38-41BC-B944-920AAF27744D}"/>
+              </a:ext>
+            </a:extLst>
+          </p:cNvPr>
+          <p:cNvSpPr>
+            <a:spLocks noGrp="1"/>
+          </p:cNvSpPr>
+          <p:nvPr>
+            <p:ph idx="11"/>
+          </p:nvPr>
+        </p:nvSpPr>
+        <p:spPr>
+          <a:xfrm>
+            <a:off x="6096000" y="1677092"/>
+            <a:ext cx="5123363" cy="3977280"/>
+          </a:xfrm>
+          <a:prstGeom prst="rect">
+            <a:avLst/>
+          </a:prstGeom>
+        </p:spPr>
+        <p:txBody>
+          <a:bodyPr lIns="0" tIns="0" rIns="0" bIns="0">
+            <a:normAutofit/>
+          </a:bodyPr>
+          <a:lstStyle/>
+          <a:p>
+            <a:pPr marL="432000" indent="-324000">
+              <a:spcBef>
+                <a:spcPts val="1417"/>
+              </a:spcBef>
+              <a:buClr>
+                <a:srgbClr val="000000"/>
+              </a:buClr>
+              <a:buSzPct val="45000"/>
+              <a:buFont typeface="Wingdings" charset="2"/>
+              <a:buChar char=""/>
+            </a:pPr>
+            <a:r>
+              <a:rPr lang="en-US" sz="3200" b="0" strike="noStrike" spc="-1" dirty="0">
+                <a:latin typeface="Arial"/>
+              </a:rPr>
+              <a:t>Click to edit the outline text format</a:t>
+            </a:r>
+          </a:p>
+          <a:p>
+            <a:pPr marL="864000" lvl="1" indent="-324000">
+              <a:spcBef>
+                <a:spcPts val="1134"/>
+              </a:spcBef>
+              <a:buClr>
+                <a:srgbClr val="000000"/>
+              </a:buClr>
+              <a:buSzPct val="75000"/>
+              <a:buFont typeface="Symbol" charset="2"/>
+              <a:buChar char=""/>
+            </a:pPr>
+            <a:r>
+              <a:rPr lang="en-US" sz="2800" b="0" strike="noStrike" spc="-1" dirty="0">
+                <a:latin typeface="Arial"/>
+              </a:rPr>
+              <a:t>Second Outline Level</a:t>
+            </a:r>
+          </a:p>
+          <a:p>
+            <a:pPr marL="1296000" lvl="2" indent="-288000">
+              <a:spcBef>
+                <a:spcPts val="850"/>
+              </a:spcBef>
+              <a:buClr>
+                <a:srgbClr val="000000"/>
+              </a:buClr>
+              <a:buSzPct val="45000"/>
+              <a:buFont typeface="Wingdings" charset="2"/>
+              <a:buChar char=""/>
+            </a:pPr>
+            <a:r>
+              <a:rPr lang="en-US" sz="2400" b="0" strike="noStrike" spc="-1" dirty="0">
+                <a:latin typeface="Arial"/>
+              </a:rPr>
+              <a:t>Third Outline Level</a:t>
+            </a:r>
+          </a:p>
+          <a:p>
+            <a:pPr marL="1728000" lvl="3" indent="-216000">
+              <a:spcBef>
+                <a:spcPts val="567"/>
+              </a:spcBef>
+              <a:buClr>
+                <a:srgbClr val="000000"/>
+              </a:buClr>
+              <a:buSzPct val="75000"/>
+              <a:buFont typeface="Symbol" charset="2"/>
+              <a:buChar char=""/>
+            </a:pPr>
+            <a:r>
+              <a:rPr lang="en-US" sz="2000" b="0" strike="noStrike" spc="-1" dirty="0">
+                <a:latin typeface="Arial"/>
+              </a:rPr>
+              <a:t>Fourth Outline Level</a:t>
+            </a:r>
+          </a:p>
+          <a:p>
+            <a:pPr marL="2160000" lvl="4" indent="-216000">
+              <a:spcBef>
+                <a:spcPts val="283"/>
+              </a:spcBef>
+              <a:buClr>
+                <a:srgbClr val="000000"/>
+              </a:buClr>
+              <a:buSzPct val="45000"/>
+              <a:buFont typeface="Wingdings" charset="2"/>
+              <a:buChar char=""/>
+            </a:pPr>
+            <a:r>
+              <a:rPr lang="en-US" sz="2000" b="0" strike="noStrike" spc="-1" dirty="0">
+                <a:latin typeface="Arial"/>
+              </a:rPr>
+              <a:t>Fifth Outline Level</a:t>
+            </a:r>
+          </a:p>
+          <a:p>
+            <a:pPr marL="2592000" lvl="5" indent="-216000">
+              <a:spcBef>
+                <a:spcPts val="283"/>
+              </a:spcBef>
+              <a:buClr>
+                <a:srgbClr val="000000"/>
+              </a:buClr>
+              <a:buSzPct val="45000"/>
+              <a:buFont typeface="Wingdings" charset="2"/>
+              <a:buChar char=""/>
+            </a:pPr>
+            <a:r>
+              <a:rPr lang="en-US" sz="2000" b="0" strike="noStrike" spc="-1" dirty="0">
+                <a:latin typeface="Arial"/>
+              </a:rPr>
+              <a:t>Sixth Outline Level</a:t>
+            </a:r>
+          </a:p>
+          <a:p>
+            <a:pPr marL="3024000" lvl="6" indent="-216000">
+              <a:spcBef>
+                <a:spcPts val="283"/>
+              </a:spcBef>
+              <a:buClr>
+                <a:srgbClr val="000000"/>
+              </a:buClr>
+              <a:buSzPct val="45000"/>
+              <a:buFont typeface="Wingdings" charset="2"/>
+              <a:buChar char=""/>
+            </a:pPr>
+            <a:r>
+              <a:rPr lang="en-US" sz="2000" b="0" strike="noStrike" spc="-1" dirty="0">
+                <a:latin typeface="Arial"/>
+              </a:rPr>
+              <a:t>Seventh Outline Level</a:t>
+            </a:r>
+          </a:p>
+        </p:txBody>
+      </p:sp>
+    </p:spTree>
+    <p:extLst>
+      <p:ext uri="{BB962C8B-B14F-4D97-AF65-F5344CB8AC3E}">
+        <p14:creationId xmlns:p14="http://schemas.microsoft.com/office/powerpoint/2010/main" val="1492042712"/>
+      </p:ext>
+    </p:extLst>
+  </p:cSld>
+  <p:clrMapOvr>
+    <a:masterClrMapping/>
+  </p:clrMapOvr>
+</p:sldLayout>
+</file>
+
+<file path=ppt/slideLayouts/slideLayout3.xml><?xml version="1.0" encoding="utf-8"?>
 <p:sldLayout xmlns:a="http://schemas.openxmlformats.org/drawingml/2006/main" xmlns:r="http://schemas.openxmlformats.org/officeDocument/2006/relationships" xmlns:p="http://schemas.openxmlformats.org/presentationml/2006/main" preserve="1" userDrawn="1">
   <p:cSld name="Blank Slide">
     <p:spTree>
@@ -1031,7 +1631,7 @@
 </p:sldLayout>
 </file>
 
-<file path=ppt/slideLayouts/slideLayout3.xml><?xml version="1.0" encoding="utf-8"?>
+<file path=ppt/slideLayouts/slideLayout4.xml><?xml version="1.0" encoding="utf-8"?>
 <p:sldLayout xmlns:a="http://schemas.openxmlformats.org/drawingml/2006/main" xmlns:r="http://schemas.openxmlformats.org/officeDocument/2006/relationships" xmlns:p="http://schemas.openxmlformats.org/presentationml/2006/main" preserve="1" userDrawn="1">
   <p:cSld name="Title, Content">
     <p:spTree>
@@ -1329,7 +1929,7 @@
     <p:bg>
       <p:bgPr>
         <a:blipFill rotWithShape="0">
-          <a:blip r:embed="rId3"/>
+          <a:blip r:embed="rId4"/>
           <a:stretch>
             <a:fillRect/>
           </a:stretch>
@@ -1358,7 +1958,7 @@
           <p:nvPr/>
         </p:nvPicPr>
         <p:blipFill>
-          <a:blip r:embed="rId4"/>
+          <a:blip r:embed="rId5"/>
           <a:srcRect l="6752" t="32283" r="7080" b="30331"/>
           <a:stretch/>
         </p:blipFill>
@@ -1707,6 +2307,7 @@
   <p:clrMap bg1="lt1" tx1="dk1" bg2="lt2" tx2="dk2" accent1="accent1" accent2="accent2" accent3="accent3" accent4="accent4" accent5="accent5" accent6="accent6" hlink="hlink" folHlink="folHlink"/>
   <p:sldLayoutIdLst>
     <p:sldLayoutId id="2147483693" r:id="rId1"/>
+    <p:sldLayoutId id="2147483694" r:id="rId2"/>
   </p:sldLayoutIdLst>
   <p:hf hdr="0" ftr="0" dt="0"/>
   <p:txStyles>
@@ -2872,28 +3473,6 @@
               <a:t>Slide Template for the Arts-lab</a:t>
             </a:r>
           </a:p>
-          <a:p>
-            <a:pPr algn="ctr">
-              <a:lnSpc>
-                <a:spcPct val="90000"/>
-              </a:lnSpc>
-              <a:spcAft>
-                <a:spcPts val="600"/>
-              </a:spcAft>
-            </a:pPr>
-            <a:r>
-              <a:rPr lang="en-US" sz="2000" b="1" spc="-1" dirty="0">
-                <a:solidFill>
-                  <a:srgbClr val="000000"/>
-                </a:solidFill>
-                <a:latin typeface="+mj-lt"/>
-              </a:rPr>
-              <a:t>Subtitles can be helpful</a:t>
-            </a:r>
-            <a:endParaRPr lang="en-US" sz="1200" b="0" strike="noStrike" spc="-1" dirty="0">
-              <a:latin typeface="+mj-lt"/>
-            </a:endParaRPr>
-          </a:p>
         </p:txBody>
       </p:sp>
       <p:sp>
@@ -3011,58 +3590,6 @@
               <a:latin typeface="+mj-lt"/>
               <a:ea typeface="Arial"/>
             </a:endParaRPr>
-          </a:p>
-        </p:txBody>
-      </p:sp>
-      <p:sp>
-        <p:nvSpPr>
-          <p:cNvPr id="16" name="TextBox 15">
-            <a:extLst>
-              <a:ext uri="{FF2B5EF4-FFF2-40B4-BE49-F238E27FC236}">
-                <a16:creationId xmlns:a16="http://schemas.microsoft.com/office/drawing/2014/main" id="{3A89B833-E4F9-4C4F-AF6F-247BA76F3EAB}"/>
-              </a:ext>
-            </a:extLst>
-          </p:cNvPr>
-          <p:cNvSpPr txBox="1"/>
-          <p:nvPr/>
-        </p:nvSpPr>
-        <p:spPr>
-          <a:xfrm>
-            <a:off x="7732297" y="4515985"/>
-            <a:ext cx="4156364" cy="923330"/>
-          </a:xfrm>
-          <a:prstGeom prst="rect">
-            <a:avLst/>
-          </a:prstGeom>
-          <a:noFill/>
-        </p:spPr>
-        <p:txBody>
-          <a:bodyPr wrap="square" rtlCol="0">
-            <a:spAutoFit/>
-          </a:bodyPr>
-          <a:lstStyle/>
-          <a:p>
-            <a:r>
-              <a:rPr lang="en-US" sz="1200" b="1" dirty="0">
-                <a:solidFill>
-                  <a:srgbClr val="000000"/>
-                </a:solidFill>
-                <a:ea typeface="Arial"/>
-              </a:rPr>
-              <a:t>Note:</a:t>
-            </a:r>
-            <a:r>
-              <a:rPr lang="en-US" sz="1200" dirty="0">
-                <a:solidFill>
-                  <a:srgbClr val="000000"/>
-                </a:solidFill>
-                <a:ea typeface="Arial"/>
-              </a:rPr>
-              <a:t> This slide format is not in the slide master, rater it is a modified version of the basic slides with a white bot in the bottom left to cover the UofSC logo.</a:t>
-            </a:r>
-          </a:p>
-          <a:p>
-            <a:endParaRPr lang="en-US" dirty="0"/>
           </a:p>
         </p:txBody>
       </p:sp>
@@ -3113,212 +3640,6 @@
           </a:extLst>
         </p:spPr>
       </p:pic>
-      <p:sp>
-        <p:nvSpPr>
-          <p:cNvPr id="10" name="Text Placeholder 2">
-            <a:extLst>
-              <a:ext uri="{FF2B5EF4-FFF2-40B4-BE49-F238E27FC236}">
-                <a16:creationId xmlns:a16="http://schemas.microsoft.com/office/drawing/2014/main" id="{9F3DE3DF-C384-4A95-9AA7-1AE869F90AAE}"/>
-              </a:ext>
-            </a:extLst>
-          </p:cNvPr>
-          <p:cNvSpPr txBox="1">
-            <a:spLocks/>
-          </p:cNvSpPr>
-          <p:nvPr/>
-        </p:nvSpPr>
-        <p:spPr>
-          <a:xfrm>
-            <a:off x="795720" y="4515985"/>
-            <a:ext cx="2647418" cy="2418394"/>
-          </a:xfrm>
-          <a:prstGeom prst="rect">
-            <a:avLst/>
-          </a:prstGeom>
-        </p:spPr>
-        <p:txBody>
-          <a:bodyPr>
-            <a:normAutofit/>
-          </a:bodyPr>
-          <a:lstStyle>
-            <a:lvl1pPr marL="228600" indent="-228600" algn="l" defTabSz="914400" rtl="0" eaLnBrk="1" latinLnBrk="0" hangingPunct="1">
-              <a:lnSpc>
-                <a:spcPct val="90000"/>
-              </a:lnSpc>
-              <a:spcBef>
-                <a:spcPts val="1000"/>
-              </a:spcBef>
-              <a:buFont typeface="Arial" panose="020B0604020202020204" pitchFamily="34" charset="0"/>
-              <a:buChar char="•"/>
-              <a:defRPr sz="2800" kern="1200">
-                <a:solidFill>
-                  <a:schemeClr val="tx1"/>
-                </a:solidFill>
-                <a:latin typeface="+mn-lt"/>
-                <a:ea typeface="+mn-ea"/>
-                <a:cs typeface="+mn-cs"/>
-              </a:defRPr>
-            </a:lvl1pPr>
-            <a:lvl2pPr marL="685800" indent="-228600" algn="l" defTabSz="914400" rtl="0" eaLnBrk="1" latinLnBrk="0" hangingPunct="1">
-              <a:lnSpc>
-                <a:spcPct val="90000"/>
-              </a:lnSpc>
-              <a:spcBef>
-                <a:spcPts val="500"/>
-              </a:spcBef>
-              <a:buFont typeface="Arial" panose="020B0604020202020204" pitchFamily="34" charset="0"/>
-              <a:buChar char="•"/>
-              <a:defRPr sz="2400" kern="1200">
-                <a:solidFill>
-                  <a:schemeClr val="tx1"/>
-                </a:solidFill>
-                <a:latin typeface="+mn-lt"/>
-                <a:ea typeface="+mn-ea"/>
-                <a:cs typeface="+mn-cs"/>
-              </a:defRPr>
-            </a:lvl2pPr>
-            <a:lvl3pPr marL="1143000" indent="-228600" algn="l" defTabSz="914400" rtl="0" eaLnBrk="1" latinLnBrk="0" hangingPunct="1">
-              <a:lnSpc>
-                <a:spcPct val="90000"/>
-              </a:lnSpc>
-              <a:spcBef>
-                <a:spcPts val="500"/>
-              </a:spcBef>
-              <a:buFont typeface="Arial" panose="020B0604020202020204" pitchFamily="34" charset="0"/>
-              <a:buChar char="•"/>
-              <a:defRPr sz="2000" kern="1200">
-                <a:solidFill>
-                  <a:schemeClr val="tx1"/>
-                </a:solidFill>
-                <a:latin typeface="+mn-lt"/>
-                <a:ea typeface="+mn-ea"/>
-                <a:cs typeface="+mn-cs"/>
-              </a:defRPr>
-            </a:lvl3pPr>
-            <a:lvl4pPr marL="1600200" indent="-228600" algn="l" defTabSz="914400" rtl="0" eaLnBrk="1" latinLnBrk="0" hangingPunct="1">
-              <a:lnSpc>
-                <a:spcPct val="90000"/>
-              </a:lnSpc>
-              <a:spcBef>
-                <a:spcPts val="500"/>
-              </a:spcBef>
-              <a:buFont typeface="Arial" panose="020B0604020202020204" pitchFamily="34" charset="0"/>
-              <a:buChar char="•"/>
-              <a:defRPr sz="1800" kern="1200">
-                <a:solidFill>
-                  <a:schemeClr val="tx1"/>
-                </a:solidFill>
-                <a:latin typeface="+mn-lt"/>
-                <a:ea typeface="+mn-ea"/>
-                <a:cs typeface="+mn-cs"/>
-              </a:defRPr>
-            </a:lvl4pPr>
-            <a:lvl5pPr marL="2057400" indent="-228600" algn="l" defTabSz="914400" rtl="0" eaLnBrk="1" latinLnBrk="0" hangingPunct="1">
-              <a:lnSpc>
-                <a:spcPct val="90000"/>
-              </a:lnSpc>
-              <a:spcBef>
-                <a:spcPts val="500"/>
-              </a:spcBef>
-              <a:buFont typeface="Arial" panose="020B0604020202020204" pitchFamily="34" charset="0"/>
-              <a:buChar char="•"/>
-              <a:defRPr sz="1800" kern="1200">
-                <a:solidFill>
-                  <a:schemeClr val="tx1"/>
-                </a:solidFill>
-                <a:latin typeface="+mn-lt"/>
-                <a:ea typeface="+mn-ea"/>
-                <a:cs typeface="+mn-cs"/>
-              </a:defRPr>
-            </a:lvl5pPr>
-            <a:lvl6pPr marL="2514600" indent="-228600" algn="l" defTabSz="914400" rtl="0" eaLnBrk="1" latinLnBrk="0" hangingPunct="1">
-              <a:lnSpc>
-                <a:spcPct val="90000"/>
-              </a:lnSpc>
-              <a:spcBef>
-                <a:spcPts val="500"/>
-              </a:spcBef>
-              <a:buFont typeface="Arial" panose="020B0604020202020204" pitchFamily="34" charset="0"/>
-              <a:buChar char="•"/>
-              <a:defRPr sz="1800" kern="1200">
-                <a:solidFill>
-                  <a:schemeClr val="tx1"/>
-                </a:solidFill>
-                <a:latin typeface="+mn-lt"/>
-                <a:ea typeface="+mn-ea"/>
-                <a:cs typeface="+mn-cs"/>
-              </a:defRPr>
-            </a:lvl6pPr>
-            <a:lvl7pPr marL="2971800" indent="-228600" algn="l" defTabSz="914400" rtl="0" eaLnBrk="1" latinLnBrk="0" hangingPunct="1">
-              <a:lnSpc>
-                <a:spcPct val="90000"/>
-              </a:lnSpc>
-              <a:spcBef>
-                <a:spcPts val="500"/>
-              </a:spcBef>
-              <a:buFont typeface="Arial" panose="020B0604020202020204" pitchFamily="34" charset="0"/>
-              <a:buChar char="•"/>
-              <a:defRPr sz="1800" kern="1200">
-                <a:solidFill>
-                  <a:schemeClr val="tx1"/>
-                </a:solidFill>
-                <a:latin typeface="+mn-lt"/>
-                <a:ea typeface="+mn-ea"/>
-                <a:cs typeface="+mn-cs"/>
-              </a:defRPr>
-            </a:lvl7pPr>
-            <a:lvl8pPr marL="3429000" indent="-228600" algn="l" defTabSz="914400" rtl="0" eaLnBrk="1" latinLnBrk="0" hangingPunct="1">
-              <a:lnSpc>
-                <a:spcPct val="90000"/>
-              </a:lnSpc>
-              <a:spcBef>
-                <a:spcPts val="500"/>
-              </a:spcBef>
-              <a:buFont typeface="Arial" panose="020B0604020202020204" pitchFamily="34" charset="0"/>
-              <a:buChar char="•"/>
-              <a:defRPr sz="1800" kern="1200">
-                <a:solidFill>
-                  <a:schemeClr val="tx1"/>
-                </a:solidFill>
-                <a:latin typeface="+mn-lt"/>
-                <a:ea typeface="+mn-ea"/>
-                <a:cs typeface="+mn-cs"/>
-              </a:defRPr>
-            </a:lvl8pPr>
-            <a:lvl9pPr marL="3886200" indent="-228600" algn="l" defTabSz="914400" rtl="0" eaLnBrk="1" latinLnBrk="0" hangingPunct="1">
-              <a:lnSpc>
-                <a:spcPct val="90000"/>
-              </a:lnSpc>
-              <a:spcBef>
-                <a:spcPts val="500"/>
-              </a:spcBef>
-              <a:buFont typeface="Arial" panose="020B0604020202020204" pitchFamily="34" charset="0"/>
-              <a:buChar char="•"/>
-              <a:defRPr sz="1800" kern="1200">
-                <a:solidFill>
-                  <a:schemeClr val="tx1"/>
-                </a:solidFill>
-                <a:latin typeface="+mn-lt"/>
-                <a:ea typeface="+mn-ea"/>
-                <a:cs typeface="+mn-cs"/>
-              </a:defRPr>
-            </a:lvl9pPr>
-          </a:lstStyle>
-          <a:p>
-            <a:pPr marL="0" indent="0">
-              <a:buNone/>
-            </a:pPr>
-            <a:r>
-              <a:rPr lang="en-US" sz="1200" b="1" dirty="0"/>
-              <a:t>Note:</a:t>
-            </a:r>
-            <a:r>
-              <a:rPr lang="en-US" sz="1200" dirty="0"/>
-              <a:t> Place the center logo by hand</a:t>
-            </a:r>
-          </a:p>
-        </p:txBody>
-      </p:sp>
     </p:spTree>
     <p:extLst>
       <p:ext uri="{BB962C8B-B14F-4D97-AF65-F5344CB8AC3E}">
@@ -3738,1671 +4059,6 @@
 </file>
 
 <file path=ppt/slides/slide3.xml><?xml version="1.0" encoding="utf-8"?>
-<p:sld xmlns:a="http://schemas.openxmlformats.org/drawingml/2006/main" xmlns:r="http://schemas.openxmlformats.org/officeDocument/2006/relationships" xmlns:p="http://schemas.openxmlformats.org/presentationml/2006/main">
-  <p:cSld>
-    <p:spTree>
-      <p:nvGrpSpPr>
-        <p:cNvPr id="1" name=""/>
-        <p:cNvGrpSpPr/>
-        <p:nvPr/>
-      </p:nvGrpSpPr>
-      <p:grpSpPr>
-        <a:xfrm>
-          <a:off x="0" y="0"/>
-          <a:ext cx="0" cy="0"/>
-          <a:chOff x="0" y="0"/>
-          <a:chExt cx="0" cy="0"/>
-        </a:xfrm>
-      </p:grpSpPr>
-      <p:sp>
-        <p:nvSpPr>
-          <p:cNvPr id="2" name="Title 1">
-            <a:extLst>
-              <a:ext uri="{FF2B5EF4-FFF2-40B4-BE49-F238E27FC236}">
-                <a16:creationId xmlns:a16="http://schemas.microsoft.com/office/drawing/2014/main" id="{92D64792-864D-4F19-A38F-9E959A9D3592}"/>
-              </a:ext>
-            </a:extLst>
-          </p:cNvPr>
-          <p:cNvSpPr>
-            <a:spLocks noGrp="1"/>
-          </p:cNvSpPr>
-          <p:nvPr>
-            <p:ph type="title"/>
-          </p:nvPr>
-        </p:nvSpPr>
-        <p:spPr>
-          <a:xfrm>
-            <a:off x="609480" y="2448360"/>
-            <a:ext cx="10972440" cy="1144800"/>
-          </a:xfrm>
-        </p:spPr>
-        <p:txBody>
-          <a:bodyPr/>
-          <a:lstStyle/>
-          <a:p>
-            <a:pPr algn="ctr"/>
-            <a:r>
-              <a:rPr lang="en-US" dirty="0"/>
-              <a:t>Progress Bars with Macros</a:t>
-            </a:r>
-          </a:p>
-        </p:txBody>
-      </p:sp>
-      <p:sp>
-        <p:nvSpPr>
-          <p:cNvPr id="5" name="TextBox 4">
-            <a:extLst>
-              <a:ext uri="{FF2B5EF4-FFF2-40B4-BE49-F238E27FC236}">
-                <a16:creationId xmlns:a16="http://schemas.microsoft.com/office/drawing/2014/main" id="{5B75F26D-292D-4039-924A-CEF0258175F2}"/>
-              </a:ext>
-            </a:extLst>
-          </p:cNvPr>
-          <p:cNvSpPr txBox="1"/>
-          <p:nvPr/>
-        </p:nvSpPr>
-        <p:spPr>
-          <a:xfrm>
-            <a:off x="7732297" y="4515985"/>
-            <a:ext cx="4156364" cy="923330"/>
-          </a:xfrm>
-          <a:prstGeom prst="rect">
-            <a:avLst/>
-          </a:prstGeom>
-          <a:noFill/>
-        </p:spPr>
-        <p:txBody>
-          <a:bodyPr wrap="square" rtlCol="0">
-            <a:spAutoFit/>
-          </a:bodyPr>
-          <a:lstStyle/>
-          <a:p>
-            <a:r>
-              <a:rPr lang="en-US" sz="1200" b="1" spc="259" dirty="0">
-                <a:solidFill>
-                  <a:schemeClr val="bg1"/>
-                </a:solidFill>
-                <a:latin typeface="+mj-lt"/>
-                <a:ea typeface="Arial"/>
-              </a:rPr>
-              <a:t>Note:</a:t>
-            </a:r>
-            <a:r>
-              <a:rPr lang="en-US" sz="1200" spc="259" dirty="0">
-                <a:solidFill>
-                  <a:schemeClr val="bg1"/>
-                </a:solidFill>
-                <a:latin typeface="+mj-lt"/>
-                <a:ea typeface="Arial"/>
-              </a:rPr>
-              <a:t> You can use red slides for section breaks, does not work well with the snake macro</a:t>
-            </a:r>
-          </a:p>
-          <a:p>
-            <a:endParaRPr lang="en-US" dirty="0"/>
-          </a:p>
-        </p:txBody>
-      </p:sp>
-    </p:spTree>
-    <p:extLst>
-      <p:ext uri="{BB962C8B-B14F-4D97-AF65-F5344CB8AC3E}">
-        <p14:creationId xmlns:p14="http://schemas.microsoft.com/office/powerpoint/2010/main" val="4183398439"/>
-      </p:ext>
-    </p:extLst>
-  </p:cSld>
-  <p:clrMapOvr>
-    <a:masterClrMapping/>
-  </p:clrMapOvr>
-</p:sld>
-</file>
-
-<file path=ppt/slides/slide4.xml><?xml version="1.0" encoding="utf-8"?>
-<p:sld xmlns:a="http://schemas.openxmlformats.org/drawingml/2006/main" xmlns:r="http://schemas.openxmlformats.org/officeDocument/2006/relationships" xmlns:p="http://schemas.openxmlformats.org/presentationml/2006/main">
-  <p:cSld>
-    <p:spTree>
-      <p:nvGrpSpPr>
-        <p:cNvPr id="1" name=""/>
-        <p:cNvGrpSpPr/>
-        <p:nvPr/>
-      </p:nvGrpSpPr>
-      <p:grpSpPr>
-        <a:xfrm>
-          <a:off x="0" y="0"/>
-          <a:ext cx="0" cy="0"/>
-          <a:chOff x="0" y="0"/>
-          <a:chExt cx="0" cy="0"/>
-        </a:xfrm>
-      </p:grpSpPr>
-      <p:sp>
-        <p:nvSpPr>
-          <p:cNvPr id="3" name="Title 1">
-            <a:extLst>
-              <a:ext uri="{FF2B5EF4-FFF2-40B4-BE49-F238E27FC236}">
-                <a16:creationId xmlns:a16="http://schemas.microsoft.com/office/drawing/2014/main" id="{2260366C-9CC9-4815-B6A0-B9386B0FC8C7}"/>
-              </a:ext>
-            </a:extLst>
-          </p:cNvPr>
-          <p:cNvSpPr txBox="1">
-            <a:spLocks/>
-          </p:cNvSpPr>
-          <p:nvPr/>
-        </p:nvSpPr>
-        <p:spPr>
-          <a:xfrm>
-            <a:off x="536189" y="567444"/>
-            <a:ext cx="10972440" cy="1144800"/>
-          </a:xfrm>
-          <a:prstGeom prst="rect">
-            <a:avLst/>
-          </a:prstGeom>
-        </p:spPr>
-        <p:txBody>
-          <a:bodyPr/>
-          <a:lstStyle>
-            <a:lvl1pPr algn="l" defTabSz="914400" rtl="0" eaLnBrk="1" latinLnBrk="0" hangingPunct="1">
-              <a:lnSpc>
-                <a:spcPct val="90000"/>
-              </a:lnSpc>
-              <a:spcBef>
-                <a:spcPct val="0"/>
-              </a:spcBef>
-              <a:buNone/>
-              <a:defRPr sz="4800" kern="1200">
-                <a:solidFill>
-                  <a:schemeClr val="tx1"/>
-                </a:solidFill>
-                <a:latin typeface="+mj-lt"/>
-                <a:ea typeface="+mj-ea"/>
-                <a:cs typeface="+mj-cs"/>
-              </a:defRPr>
-            </a:lvl1pPr>
-          </a:lstStyle>
-          <a:p>
-            <a:r>
-              <a:rPr lang="en-US" sz="3000" dirty="0"/>
-              <a:t>Custom Macros to make progress bars</a:t>
-            </a:r>
-          </a:p>
-        </p:txBody>
-      </p:sp>
-      <p:sp>
-        <p:nvSpPr>
-          <p:cNvPr id="4" name="Text Placeholder 2">
-            <a:extLst>
-              <a:ext uri="{FF2B5EF4-FFF2-40B4-BE49-F238E27FC236}">
-                <a16:creationId xmlns:a16="http://schemas.microsoft.com/office/drawing/2014/main" id="{3B9600C4-DAE1-425A-9DAE-DB1914B17067}"/>
-              </a:ext>
-            </a:extLst>
-          </p:cNvPr>
-          <p:cNvSpPr txBox="1">
-            <a:spLocks/>
-          </p:cNvSpPr>
-          <p:nvPr/>
-        </p:nvSpPr>
-        <p:spPr>
-          <a:xfrm>
-            <a:off x="683371" y="1089537"/>
-            <a:ext cx="10972440" cy="594167"/>
-          </a:xfrm>
-          <a:prstGeom prst="rect">
-            <a:avLst/>
-          </a:prstGeom>
-        </p:spPr>
-        <p:txBody>
-          <a:bodyPr>
-            <a:normAutofit/>
-          </a:bodyPr>
-          <a:lstStyle>
-            <a:lvl1pPr marL="228600" indent="-228600" algn="l" defTabSz="914400" rtl="0" eaLnBrk="1" latinLnBrk="0" hangingPunct="1">
-              <a:lnSpc>
-                <a:spcPct val="90000"/>
-              </a:lnSpc>
-              <a:spcBef>
-                <a:spcPts val="1000"/>
-              </a:spcBef>
-              <a:buFont typeface="Arial" panose="020B0604020202020204" pitchFamily="34" charset="0"/>
-              <a:buChar char="•"/>
-              <a:defRPr sz="2800" kern="1200">
-                <a:solidFill>
-                  <a:schemeClr val="tx1"/>
-                </a:solidFill>
-                <a:latin typeface="+mn-lt"/>
-                <a:ea typeface="+mn-ea"/>
-                <a:cs typeface="+mn-cs"/>
-              </a:defRPr>
-            </a:lvl1pPr>
-            <a:lvl2pPr marL="685800" indent="-228600" algn="l" defTabSz="914400" rtl="0" eaLnBrk="1" latinLnBrk="0" hangingPunct="1">
-              <a:lnSpc>
-                <a:spcPct val="90000"/>
-              </a:lnSpc>
-              <a:spcBef>
-                <a:spcPts val="500"/>
-              </a:spcBef>
-              <a:buFont typeface="Arial" panose="020B0604020202020204" pitchFamily="34" charset="0"/>
-              <a:buChar char="•"/>
-              <a:defRPr sz="2400" kern="1200">
-                <a:solidFill>
-                  <a:schemeClr val="tx1"/>
-                </a:solidFill>
-                <a:latin typeface="+mn-lt"/>
-                <a:ea typeface="+mn-ea"/>
-                <a:cs typeface="+mn-cs"/>
-              </a:defRPr>
-            </a:lvl2pPr>
-            <a:lvl3pPr marL="1143000" indent="-228600" algn="l" defTabSz="914400" rtl="0" eaLnBrk="1" latinLnBrk="0" hangingPunct="1">
-              <a:lnSpc>
-                <a:spcPct val="90000"/>
-              </a:lnSpc>
-              <a:spcBef>
-                <a:spcPts val="500"/>
-              </a:spcBef>
-              <a:buFont typeface="Arial" panose="020B0604020202020204" pitchFamily="34" charset="0"/>
-              <a:buChar char="•"/>
-              <a:defRPr sz="2000" kern="1200">
-                <a:solidFill>
-                  <a:schemeClr val="tx1"/>
-                </a:solidFill>
-                <a:latin typeface="+mn-lt"/>
-                <a:ea typeface="+mn-ea"/>
-                <a:cs typeface="+mn-cs"/>
-              </a:defRPr>
-            </a:lvl3pPr>
-            <a:lvl4pPr marL="1600200" indent="-228600" algn="l" defTabSz="914400" rtl="0" eaLnBrk="1" latinLnBrk="0" hangingPunct="1">
-              <a:lnSpc>
-                <a:spcPct val="90000"/>
-              </a:lnSpc>
-              <a:spcBef>
-                <a:spcPts val="500"/>
-              </a:spcBef>
-              <a:buFont typeface="Arial" panose="020B0604020202020204" pitchFamily="34" charset="0"/>
-              <a:buChar char="•"/>
-              <a:defRPr sz="1800" kern="1200">
-                <a:solidFill>
-                  <a:schemeClr val="tx1"/>
-                </a:solidFill>
-                <a:latin typeface="+mn-lt"/>
-                <a:ea typeface="+mn-ea"/>
-                <a:cs typeface="+mn-cs"/>
-              </a:defRPr>
-            </a:lvl4pPr>
-            <a:lvl5pPr marL="2057400" indent="-228600" algn="l" defTabSz="914400" rtl="0" eaLnBrk="1" latinLnBrk="0" hangingPunct="1">
-              <a:lnSpc>
-                <a:spcPct val="90000"/>
-              </a:lnSpc>
-              <a:spcBef>
-                <a:spcPts val="500"/>
-              </a:spcBef>
-              <a:buFont typeface="Arial" panose="020B0604020202020204" pitchFamily="34" charset="0"/>
-              <a:buChar char="•"/>
-              <a:defRPr sz="1800" kern="1200">
-                <a:solidFill>
-                  <a:schemeClr val="tx1"/>
-                </a:solidFill>
-                <a:latin typeface="+mn-lt"/>
-                <a:ea typeface="+mn-ea"/>
-                <a:cs typeface="+mn-cs"/>
-              </a:defRPr>
-            </a:lvl5pPr>
-            <a:lvl6pPr marL="2514600" indent="-228600" algn="l" defTabSz="914400" rtl="0" eaLnBrk="1" latinLnBrk="0" hangingPunct="1">
-              <a:lnSpc>
-                <a:spcPct val="90000"/>
-              </a:lnSpc>
-              <a:spcBef>
-                <a:spcPts val="500"/>
-              </a:spcBef>
-              <a:buFont typeface="Arial" panose="020B0604020202020204" pitchFamily="34" charset="0"/>
-              <a:buChar char="•"/>
-              <a:defRPr sz="1800" kern="1200">
-                <a:solidFill>
-                  <a:schemeClr val="tx1"/>
-                </a:solidFill>
-                <a:latin typeface="+mn-lt"/>
-                <a:ea typeface="+mn-ea"/>
-                <a:cs typeface="+mn-cs"/>
-              </a:defRPr>
-            </a:lvl6pPr>
-            <a:lvl7pPr marL="2971800" indent="-228600" algn="l" defTabSz="914400" rtl="0" eaLnBrk="1" latinLnBrk="0" hangingPunct="1">
-              <a:lnSpc>
-                <a:spcPct val="90000"/>
-              </a:lnSpc>
-              <a:spcBef>
-                <a:spcPts val="500"/>
-              </a:spcBef>
-              <a:buFont typeface="Arial" panose="020B0604020202020204" pitchFamily="34" charset="0"/>
-              <a:buChar char="•"/>
-              <a:defRPr sz="1800" kern="1200">
-                <a:solidFill>
-                  <a:schemeClr val="tx1"/>
-                </a:solidFill>
-                <a:latin typeface="+mn-lt"/>
-                <a:ea typeface="+mn-ea"/>
-                <a:cs typeface="+mn-cs"/>
-              </a:defRPr>
-            </a:lvl7pPr>
-            <a:lvl8pPr marL="3429000" indent="-228600" algn="l" defTabSz="914400" rtl="0" eaLnBrk="1" latinLnBrk="0" hangingPunct="1">
-              <a:lnSpc>
-                <a:spcPct val="90000"/>
-              </a:lnSpc>
-              <a:spcBef>
-                <a:spcPts val="500"/>
-              </a:spcBef>
-              <a:buFont typeface="Arial" panose="020B0604020202020204" pitchFamily="34" charset="0"/>
-              <a:buChar char="•"/>
-              <a:defRPr sz="1800" kern="1200">
-                <a:solidFill>
-                  <a:schemeClr val="tx1"/>
-                </a:solidFill>
-                <a:latin typeface="+mn-lt"/>
-                <a:ea typeface="+mn-ea"/>
-                <a:cs typeface="+mn-cs"/>
-              </a:defRPr>
-            </a:lvl8pPr>
-            <a:lvl9pPr marL="3886200" indent="-228600" algn="l" defTabSz="914400" rtl="0" eaLnBrk="1" latinLnBrk="0" hangingPunct="1">
-              <a:lnSpc>
-                <a:spcPct val="90000"/>
-              </a:lnSpc>
-              <a:spcBef>
-                <a:spcPts val="500"/>
-              </a:spcBef>
-              <a:buFont typeface="Arial" panose="020B0604020202020204" pitchFamily="34" charset="0"/>
-              <a:buChar char="•"/>
-              <a:defRPr sz="1800" kern="1200">
-                <a:solidFill>
-                  <a:schemeClr val="tx1"/>
-                </a:solidFill>
-                <a:latin typeface="+mn-lt"/>
-                <a:ea typeface="+mn-ea"/>
-                <a:cs typeface="+mn-cs"/>
-              </a:defRPr>
-            </a:lvl9pPr>
-          </a:lstStyle>
-          <a:p>
-            <a:r>
-              <a:rPr lang="en-US" sz="1800" dirty="0" err="1"/>
-              <a:t>progressBarSnake</a:t>
-            </a:r>
-            <a:endParaRPr lang="en-US" sz="1800" dirty="0"/>
-          </a:p>
-        </p:txBody>
-      </p:sp>
-      <p:sp>
-        <p:nvSpPr>
-          <p:cNvPr id="8" name="Text Placeholder 2">
-            <a:extLst>
-              <a:ext uri="{FF2B5EF4-FFF2-40B4-BE49-F238E27FC236}">
-                <a16:creationId xmlns:a16="http://schemas.microsoft.com/office/drawing/2014/main" id="{F8E8F07C-6BC2-4145-8547-20704F221674}"/>
-              </a:ext>
-            </a:extLst>
-          </p:cNvPr>
-          <p:cNvSpPr txBox="1">
-            <a:spLocks/>
-          </p:cNvSpPr>
-          <p:nvPr/>
-        </p:nvSpPr>
-        <p:spPr>
-          <a:xfrm>
-            <a:off x="609780" y="3655740"/>
-            <a:ext cx="10972440" cy="594167"/>
-          </a:xfrm>
-          <a:prstGeom prst="rect">
-            <a:avLst/>
-          </a:prstGeom>
-        </p:spPr>
-        <p:txBody>
-          <a:bodyPr>
-            <a:normAutofit/>
-          </a:bodyPr>
-          <a:lstStyle>
-            <a:lvl1pPr marL="228600" indent="-228600" algn="l" defTabSz="914400" rtl="0" eaLnBrk="1" latinLnBrk="0" hangingPunct="1">
-              <a:lnSpc>
-                <a:spcPct val="90000"/>
-              </a:lnSpc>
-              <a:spcBef>
-                <a:spcPts val="1000"/>
-              </a:spcBef>
-              <a:buFont typeface="Arial" panose="020B0604020202020204" pitchFamily="34" charset="0"/>
-              <a:buChar char="•"/>
-              <a:defRPr sz="2800" kern="1200">
-                <a:solidFill>
-                  <a:schemeClr val="tx1"/>
-                </a:solidFill>
-                <a:latin typeface="+mn-lt"/>
-                <a:ea typeface="+mn-ea"/>
-                <a:cs typeface="+mn-cs"/>
-              </a:defRPr>
-            </a:lvl1pPr>
-            <a:lvl2pPr marL="685800" indent="-228600" algn="l" defTabSz="914400" rtl="0" eaLnBrk="1" latinLnBrk="0" hangingPunct="1">
-              <a:lnSpc>
-                <a:spcPct val="90000"/>
-              </a:lnSpc>
-              <a:spcBef>
-                <a:spcPts val="500"/>
-              </a:spcBef>
-              <a:buFont typeface="Arial" panose="020B0604020202020204" pitchFamily="34" charset="0"/>
-              <a:buChar char="•"/>
-              <a:defRPr sz="2400" kern="1200">
-                <a:solidFill>
-                  <a:schemeClr val="tx1"/>
-                </a:solidFill>
-                <a:latin typeface="+mn-lt"/>
-                <a:ea typeface="+mn-ea"/>
-                <a:cs typeface="+mn-cs"/>
-              </a:defRPr>
-            </a:lvl2pPr>
-            <a:lvl3pPr marL="1143000" indent="-228600" algn="l" defTabSz="914400" rtl="0" eaLnBrk="1" latinLnBrk="0" hangingPunct="1">
-              <a:lnSpc>
-                <a:spcPct val="90000"/>
-              </a:lnSpc>
-              <a:spcBef>
-                <a:spcPts val="500"/>
-              </a:spcBef>
-              <a:buFont typeface="Arial" panose="020B0604020202020204" pitchFamily="34" charset="0"/>
-              <a:buChar char="•"/>
-              <a:defRPr sz="2000" kern="1200">
-                <a:solidFill>
-                  <a:schemeClr val="tx1"/>
-                </a:solidFill>
-                <a:latin typeface="+mn-lt"/>
-                <a:ea typeface="+mn-ea"/>
-                <a:cs typeface="+mn-cs"/>
-              </a:defRPr>
-            </a:lvl3pPr>
-            <a:lvl4pPr marL="1600200" indent="-228600" algn="l" defTabSz="914400" rtl="0" eaLnBrk="1" latinLnBrk="0" hangingPunct="1">
-              <a:lnSpc>
-                <a:spcPct val="90000"/>
-              </a:lnSpc>
-              <a:spcBef>
-                <a:spcPts val="500"/>
-              </a:spcBef>
-              <a:buFont typeface="Arial" panose="020B0604020202020204" pitchFamily="34" charset="0"/>
-              <a:buChar char="•"/>
-              <a:defRPr sz="1800" kern="1200">
-                <a:solidFill>
-                  <a:schemeClr val="tx1"/>
-                </a:solidFill>
-                <a:latin typeface="+mn-lt"/>
-                <a:ea typeface="+mn-ea"/>
-                <a:cs typeface="+mn-cs"/>
-              </a:defRPr>
-            </a:lvl4pPr>
-            <a:lvl5pPr marL="2057400" indent="-228600" algn="l" defTabSz="914400" rtl="0" eaLnBrk="1" latinLnBrk="0" hangingPunct="1">
-              <a:lnSpc>
-                <a:spcPct val="90000"/>
-              </a:lnSpc>
-              <a:spcBef>
-                <a:spcPts val="500"/>
-              </a:spcBef>
-              <a:buFont typeface="Arial" panose="020B0604020202020204" pitchFamily="34" charset="0"/>
-              <a:buChar char="•"/>
-              <a:defRPr sz="1800" kern="1200">
-                <a:solidFill>
-                  <a:schemeClr val="tx1"/>
-                </a:solidFill>
-                <a:latin typeface="+mn-lt"/>
-                <a:ea typeface="+mn-ea"/>
-                <a:cs typeface="+mn-cs"/>
-              </a:defRPr>
-            </a:lvl5pPr>
-            <a:lvl6pPr marL="2514600" indent="-228600" algn="l" defTabSz="914400" rtl="0" eaLnBrk="1" latinLnBrk="0" hangingPunct="1">
-              <a:lnSpc>
-                <a:spcPct val="90000"/>
-              </a:lnSpc>
-              <a:spcBef>
-                <a:spcPts val="500"/>
-              </a:spcBef>
-              <a:buFont typeface="Arial" panose="020B0604020202020204" pitchFamily="34" charset="0"/>
-              <a:buChar char="•"/>
-              <a:defRPr sz="1800" kern="1200">
-                <a:solidFill>
-                  <a:schemeClr val="tx1"/>
-                </a:solidFill>
-                <a:latin typeface="+mn-lt"/>
-                <a:ea typeface="+mn-ea"/>
-                <a:cs typeface="+mn-cs"/>
-              </a:defRPr>
-            </a:lvl6pPr>
-            <a:lvl7pPr marL="2971800" indent="-228600" algn="l" defTabSz="914400" rtl="0" eaLnBrk="1" latinLnBrk="0" hangingPunct="1">
-              <a:lnSpc>
-                <a:spcPct val="90000"/>
-              </a:lnSpc>
-              <a:spcBef>
-                <a:spcPts val="500"/>
-              </a:spcBef>
-              <a:buFont typeface="Arial" panose="020B0604020202020204" pitchFamily="34" charset="0"/>
-              <a:buChar char="•"/>
-              <a:defRPr sz="1800" kern="1200">
-                <a:solidFill>
-                  <a:schemeClr val="tx1"/>
-                </a:solidFill>
-                <a:latin typeface="+mn-lt"/>
-                <a:ea typeface="+mn-ea"/>
-                <a:cs typeface="+mn-cs"/>
-              </a:defRPr>
-            </a:lvl7pPr>
-            <a:lvl8pPr marL="3429000" indent="-228600" algn="l" defTabSz="914400" rtl="0" eaLnBrk="1" latinLnBrk="0" hangingPunct="1">
-              <a:lnSpc>
-                <a:spcPct val="90000"/>
-              </a:lnSpc>
-              <a:spcBef>
-                <a:spcPts val="500"/>
-              </a:spcBef>
-              <a:buFont typeface="Arial" panose="020B0604020202020204" pitchFamily="34" charset="0"/>
-              <a:buChar char="•"/>
-              <a:defRPr sz="1800" kern="1200">
-                <a:solidFill>
-                  <a:schemeClr val="tx1"/>
-                </a:solidFill>
-                <a:latin typeface="+mn-lt"/>
-                <a:ea typeface="+mn-ea"/>
-                <a:cs typeface="+mn-cs"/>
-              </a:defRPr>
-            </a:lvl8pPr>
-            <a:lvl9pPr marL="3886200" indent="-228600" algn="l" defTabSz="914400" rtl="0" eaLnBrk="1" latinLnBrk="0" hangingPunct="1">
-              <a:lnSpc>
-                <a:spcPct val="90000"/>
-              </a:lnSpc>
-              <a:spcBef>
-                <a:spcPts val="500"/>
-              </a:spcBef>
-              <a:buFont typeface="Arial" panose="020B0604020202020204" pitchFamily="34" charset="0"/>
-              <a:buChar char="•"/>
-              <a:defRPr sz="1800" kern="1200">
-                <a:solidFill>
-                  <a:schemeClr val="tx1"/>
-                </a:solidFill>
-                <a:latin typeface="+mn-lt"/>
-                <a:ea typeface="+mn-ea"/>
-                <a:cs typeface="+mn-cs"/>
-              </a:defRPr>
-            </a:lvl9pPr>
-          </a:lstStyle>
-          <a:p>
-            <a:r>
-              <a:rPr lang="en-US" sz="1800" dirty="0" err="1"/>
-              <a:t>progressBarBlack</a:t>
-            </a:r>
-            <a:endParaRPr lang="en-US" sz="1800" dirty="0"/>
-          </a:p>
-        </p:txBody>
-      </p:sp>
-      <p:sp>
-        <p:nvSpPr>
-          <p:cNvPr id="9" name="Text Placeholder 2">
-            <a:extLst>
-              <a:ext uri="{FF2B5EF4-FFF2-40B4-BE49-F238E27FC236}">
-                <a16:creationId xmlns:a16="http://schemas.microsoft.com/office/drawing/2014/main" id="{E9DCC0D5-4DCC-4536-AE86-4C393404FA0E}"/>
-              </a:ext>
-            </a:extLst>
-          </p:cNvPr>
-          <p:cNvSpPr txBox="1">
-            <a:spLocks/>
-          </p:cNvSpPr>
-          <p:nvPr/>
-        </p:nvSpPr>
-        <p:spPr>
-          <a:xfrm>
-            <a:off x="6904081" y="1489065"/>
-            <a:ext cx="4678139" cy="716732"/>
-          </a:xfrm>
-          <a:prstGeom prst="rect">
-            <a:avLst/>
-          </a:prstGeom>
-        </p:spPr>
-        <p:txBody>
-          <a:bodyPr>
-            <a:normAutofit/>
-          </a:bodyPr>
-          <a:lstStyle>
-            <a:lvl1pPr marL="228600" indent="-228600" algn="l" defTabSz="914400" rtl="0" eaLnBrk="1" latinLnBrk="0" hangingPunct="1">
-              <a:lnSpc>
-                <a:spcPct val="90000"/>
-              </a:lnSpc>
-              <a:spcBef>
-                <a:spcPts val="1000"/>
-              </a:spcBef>
-              <a:buFont typeface="Arial" panose="020B0604020202020204" pitchFamily="34" charset="0"/>
-              <a:buChar char="•"/>
-              <a:defRPr sz="2800" kern="1200">
-                <a:solidFill>
-                  <a:schemeClr val="tx1"/>
-                </a:solidFill>
-                <a:latin typeface="+mn-lt"/>
-                <a:ea typeface="+mn-ea"/>
-                <a:cs typeface="+mn-cs"/>
-              </a:defRPr>
-            </a:lvl1pPr>
-            <a:lvl2pPr marL="685800" indent="-228600" algn="l" defTabSz="914400" rtl="0" eaLnBrk="1" latinLnBrk="0" hangingPunct="1">
-              <a:lnSpc>
-                <a:spcPct val="90000"/>
-              </a:lnSpc>
-              <a:spcBef>
-                <a:spcPts val="500"/>
-              </a:spcBef>
-              <a:buFont typeface="Arial" panose="020B0604020202020204" pitchFamily="34" charset="0"/>
-              <a:buChar char="•"/>
-              <a:defRPr sz="2400" kern="1200">
-                <a:solidFill>
-                  <a:schemeClr val="tx1"/>
-                </a:solidFill>
-                <a:latin typeface="+mn-lt"/>
-                <a:ea typeface="+mn-ea"/>
-                <a:cs typeface="+mn-cs"/>
-              </a:defRPr>
-            </a:lvl2pPr>
-            <a:lvl3pPr marL="1143000" indent="-228600" algn="l" defTabSz="914400" rtl="0" eaLnBrk="1" latinLnBrk="0" hangingPunct="1">
-              <a:lnSpc>
-                <a:spcPct val="90000"/>
-              </a:lnSpc>
-              <a:spcBef>
-                <a:spcPts val="500"/>
-              </a:spcBef>
-              <a:buFont typeface="Arial" panose="020B0604020202020204" pitchFamily="34" charset="0"/>
-              <a:buChar char="•"/>
-              <a:defRPr sz="2000" kern="1200">
-                <a:solidFill>
-                  <a:schemeClr val="tx1"/>
-                </a:solidFill>
-                <a:latin typeface="+mn-lt"/>
-                <a:ea typeface="+mn-ea"/>
-                <a:cs typeface="+mn-cs"/>
-              </a:defRPr>
-            </a:lvl3pPr>
-            <a:lvl4pPr marL="1600200" indent="-228600" algn="l" defTabSz="914400" rtl="0" eaLnBrk="1" latinLnBrk="0" hangingPunct="1">
-              <a:lnSpc>
-                <a:spcPct val="90000"/>
-              </a:lnSpc>
-              <a:spcBef>
-                <a:spcPts val="500"/>
-              </a:spcBef>
-              <a:buFont typeface="Arial" panose="020B0604020202020204" pitchFamily="34" charset="0"/>
-              <a:buChar char="•"/>
-              <a:defRPr sz="1800" kern="1200">
-                <a:solidFill>
-                  <a:schemeClr val="tx1"/>
-                </a:solidFill>
-                <a:latin typeface="+mn-lt"/>
-                <a:ea typeface="+mn-ea"/>
-                <a:cs typeface="+mn-cs"/>
-              </a:defRPr>
-            </a:lvl4pPr>
-            <a:lvl5pPr marL="2057400" indent="-228600" algn="l" defTabSz="914400" rtl="0" eaLnBrk="1" latinLnBrk="0" hangingPunct="1">
-              <a:lnSpc>
-                <a:spcPct val="90000"/>
-              </a:lnSpc>
-              <a:spcBef>
-                <a:spcPts val="500"/>
-              </a:spcBef>
-              <a:buFont typeface="Arial" panose="020B0604020202020204" pitchFamily="34" charset="0"/>
-              <a:buChar char="•"/>
-              <a:defRPr sz="1800" kern="1200">
-                <a:solidFill>
-                  <a:schemeClr val="tx1"/>
-                </a:solidFill>
-                <a:latin typeface="+mn-lt"/>
-                <a:ea typeface="+mn-ea"/>
-                <a:cs typeface="+mn-cs"/>
-              </a:defRPr>
-            </a:lvl5pPr>
-            <a:lvl6pPr marL="2514600" indent="-228600" algn="l" defTabSz="914400" rtl="0" eaLnBrk="1" latinLnBrk="0" hangingPunct="1">
-              <a:lnSpc>
-                <a:spcPct val="90000"/>
-              </a:lnSpc>
-              <a:spcBef>
-                <a:spcPts val="500"/>
-              </a:spcBef>
-              <a:buFont typeface="Arial" panose="020B0604020202020204" pitchFamily="34" charset="0"/>
-              <a:buChar char="•"/>
-              <a:defRPr sz="1800" kern="1200">
-                <a:solidFill>
-                  <a:schemeClr val="tx1"/>
-                </a:solidFill>
-                <a:latin typeface="+mn-lt"/>
-                <a:ea typeface="+mn-ea"/>
-                <a:cs typeface="+mn-cs"/>
-              </a:defRPr>
-            </a:lvl6pPr>
-            <a:lvl7pPr marL="2971800" indent="-228600" algn="l" defTabSz="914400" rtl="0" eaLnBrk="1" latinLnBrk="0" hangingPunct="1">
-              <a:lnSpc>
-                <a:spcPct val="90000"/>
-              </a:lnSpc>
-              <a:spcBef>
-                <a:spcPts val="500"/>
-              </a:spcBef>
-              <a:buFont typeface="Arial" panose="020B0604020202020204" pitchFamily="34" charset="0"/>
-              <a:buChar char="•"/>
-              <a:defRPr sz="1800" kern="1200">
-                <a:solidFill>
-                  <a:schemeClr val="tx1"/>
-                </a:solidFill>
-                <a:latin typeface="+mn-lt"/>
-                <a:ea typeface="+mn-ea"/>
-                <a:cs typeface="+mn-cs"/>
-              </a:defRPr>
-            </a:lvl7pPr>
-            <a:lvl8pPr marL="3429000" indent="-228600" algn="l" defTabSz="914400" rtl="0" eaLnBrk="1" latinLnBrk="0" hangingPunct="1">
-              <a:lnSpc>
-                <a:spcPct val="90000"/>
-              </a:lnSpc>
-              <a:spcBef>
-                <a:spcPts val="500"/>
-              </a:spcBef>
-              <a:buFont typeface="Arial" panose="020B0604020202020204" pitchFamily="34" charset="0"/>
-              <a:buChar char="•"/>
-              <a:defRPr sz="1800" kern="1200">
-                <a:solidFill>
-                  <a:schemeClr val="tx1"/>
-                </a:solidFill>
-                <a:latin typeface="+mn-lt"/>
-                <a:ea typeface="+mn-ea"/>
-                <a:cs typeface="+mn-cs"/>
-              </a:defRPr>
-            </a:lvl8pPr>
-            <a:lvl9pPr marL="3886200" indent="-228600" algn="l" defTabSz="914400" rtl="0" eaLnBrk="1" latinLnBrk="0" hangingPunct="1">
-              <a:lnSpc>
-                <a:spcPct val="90000"/>
-              </a:lnSpc>
-              <a:spcBef>
-                <a:spcPts val="500"/>
-              </a:spcBef>
-              <a:buFont typeface="Arial" panose="020B0604020202020204" pitchFamily="34" charset="0"/>
-              <a:buChar char="•"/>
-              <a:defRPr sz="1800" kern="1200">
-                <a:solidFill>
-                  <a:schemeClr val="tx1"/>
-                </a:solidFill>
-                <a:latin typeface="+mn-lt"/>
-                <a:ea typeface="+mn-ea"/>
-                <a:cs typeface="+mn-cs"/>
-              </a:defRPr>
-            </a:lvl9pPr>
-          </a:lstStyle>
-          <a:p>
-            <a:pPr marL="0" indent="0">
-              <a:buNone/>
-            </a:pPr>
-            <a:r>
-              <a:rPr lang="en-US" sz="1200" b="1" dirty="0"/>
-              <a:t>Note:</a:t>
-            </a:r>
-            <a:r>
-              <a:rPr lang="en-US" sz="1200" dirty="0"/>
-              <a:t> To save the macro’s you have to enable macros, this changes the .ppt to .</a:t>
-            </a:r>
-            <a:r>
-              <a:rPr lang="en-US" sz="1200" dirty="0" err="1"/>
-              <a:t>pptm</a:t>
-            </a:r>
-            <a:r>
-              <a:rPr lang="en-US" sz="1200" dirty="0"/>
-              <a:t>. The template is not provided in the .</a:t>
-            </a:r>
-            <a:r>
-              <a:rPr lang="en-US" sz="1200" dirty="0" err="1"/>
-              <a:t>pptm</a:t>
-            </a:r>
-            <a:r>
-              <a:rPr lang="en-US" sz="1200" dirty="0"/>
-              <a:t> format as this is generally poor practice for security reasons. </a:t>
-            </a:r>
-          </a:p>
-        </p:txBody>
-      </p:sp>
-      <p:pic>
-        <p:nvPicPr>
-          <p:cNvPr id="23" name="Picture 22">
-            <a:extLst>
-              <a:ext uri="{FF2B5EF4-FFF2-40B4-BE49-F238E27FC236}">
-                <a16:creationId xmlns:a16="http://schemas.microsoft.com/office/drawing/2014/main" id="{E0292688-4BE1-4A81-A3B3-CBC609716F51}"/>
-              </a:ext>
-            </a:extLst>
-          </p:cNvPr>
-          <p:cNvPicPr>
-            <a:picLocks noChangeAspect="1"/>
-          </p:cNvPicPr>
-          <p:nvPr/>
-        </p:nvPicPr>
-        <p:blipFill>
-          <a:blip r:embed="rId2"/>
-          <a:stretch>
-            <a:fillRect/>
-          </a:stretch>
-        </p:blipFill>
-        <p:spPr>
-          <a:xfrm>
-            <a:off x="974160" y="4001368"/>
-            <a:ext cx="5048249" cy="2147887"/>
-          </a:xfrm>
-          <a:prstGeom prst="rect">
-            <a:avLst/>
-          </a:prstGeom>
-        </p:spPr>
-      </p:pic>
-      <p:sp>
-        <p:nvSpPr>
-          <p:cNvPr id="24" name="Text Placeholder 2">
-            <a:extLst>
-              <a:ext uri="{FF2B5EF4-FFF2-40B4-BE49-F238E27FC236}">
-                <a16:creationId xmlns:a16="http://schemas.microsoft.com/office/drawing/2014/main" id="{15AF4184-869A-4A7E-8DF9-98B7A4037DD9}"/>
-              </a:ext>
-            </a:extLst>
-          </p:cNvPr>
-          <p:cNvSpPr txBox="1">
-            <a:spLocks/>
-          </p:cNvSpPr>
-          <p:nvPr/>
-        </p:nvSpPr>
-        <p:spPr>
-          <a:xfrm>
-            <a:off x="6904081" y="2416915"/>
-            <a:ext cx="4678139" cy="716732"/>
-          </a:xfrm>
-          <a:prstGeom prst="rect">
-            <a:avLst/>
-          </a:prstGeom>
-        </p:spPr>
-        <p:txBody>
-          <a:bodyPr>
-            <a:normAutofit/>
-          </a:bodyPr>
-          <a:lstStyle>
-            <a:lvl1pPr marL="228600" indent="-228600" algn="l" defTabSz="914400" rtl="0" eaLnBrk="1" latinLnBrk="0" hangingPunct="1">
-              <a:lnSpc>
-                <a:spcPct val="90000"/>
-              </a:lnSpc>
-              <a:spcBef>
-                <a:spcPts val="1000"/>
-              </a:spcBef>
-              <a:buFont typeface="Arial" panose="020B0604020202020204" pitchFamily="34" charset="0"/>
-              <a:buChar char="•"/>
-              <a:defRPr sz="2800" kern="1200">
-                <a:solidFill>
-                  <a:schemeClr val="tx1"/>
-                </a:solidFill>
-                <a:latin typeface="+mn-lt"/>
-                <a:ea typeface="+mn-ea"/>
-                <a:cs typeface="+mn-cs"/>
-              </a:defRPr>
-            </a:lvl1pPr>
-            <a:lvl2pPr marL="685800" indent="-228600" algn="l" defTabSz="914400" rtl="0" eaLnBrk="1" latinLnBrk="0" hangingPunct="1">
-              <a:lnSpc>
-                <a:spcPct val="90000"/>
-              </a:lnSpc>
-              <a:spcBef>
-                <a:spcPts val="500"/>
-              </a:spcBef>
-              <a:buFont typeface="Arial" panose="020B0604020202020204" pitchFamily="34" charset="0"/>
-              <a:buChar char="•"/>
-              <a:defRPr sz="2400" kern="1200">
-                <a:solidFill>
-                  <a:schemeClr val="tx1"/>
-                </a:solidFill>
-                <a:latin typeface="+mn-lt"/>
-                <a:ea typeface="+mn-ea"/>
-                <a:cs typeface="+mn-cs"/>
-              </a:defRPr>
-            </a:lvl2pPr>
-            <a:lvl3pPr marL="1143000" indent="-228600" algn="l" defTabSz="914400" rtl="0" eaLnBrk="1" latinLnBrk="0" hangingPunct="1">
-              <a:lnSpc>
-                <a:spcPct val="90000"/>
-              </a:lnSpc>
-              <a:spcBef>
-                <a:spcPts val="500"/>
-              </a:spcBef>
-              <a:buFont typeface="Arial" panose="020B0604020202020204" pitchFamily="34" charset="0"/>
-              <a:buChar char="•"/>
-              <a:defRPr sz="2000" kern="1200">
-                <a:solidFill>
-                  <a:schemeClr val="tx1"/>
-                </a:solidFill>
-                <a:latin typeface="+mn-lt"/>
-                <a:ea typeface="+mn-ea"/>
-                <a:cs typeface="+mn-cs"/>
-              </a:defRPr>
-            </a:lvl3pPr>
-            <a:lvl4pPr marL="1600200" indent="-228600" algn="l" defTabSz="914400" rtl="0" eaLnBrk="1" latinLnBrk="0" hangingPunct="1">
-              <a:lnSpc>
-                <a:spcPct val="90000"/>
-              </a:lnSpc>
-              <a:spcBef>
-                <a:spcPts val="500"/>
-              </a:spcBef>
-              <a:buFont typeface="Arial" panose="020B0604020202020204" pitchFamily="34" charset="0"/>
-              <a:buChar char="•"/>
-              <a:defRPr sz="1800" kern="1200">
-                <a:solidFill>
-                  <a:schemeClr val="tx1"/>
-                </a:solidFill>
-                <a:latin typeface="+mn-lt"/>
-                <a:ea typeface="+mn-ea"/>
-                <a:cs typeface="+mn-cs"/>
-              </a:defRPr>
-            </a:lvl4pPr>
-            <a:lvl5pPr marL="2057400" indent="-228600" algn="l" defTabSz="914400" rtl="0" eaLnBrk="1" latinLnBrk="0" hangingPunct="1">
-              <a:lnSpc>
-                <a:spcPct val="90000"/>
-              </a:lnSpc>
-              <a:spcBef>
-                <a:spcPts val="500"/>
-              </a:spcBef>
-              <a:buFont typeface="Arial" panose="020B0604020202020204" pitchFamily="34" charset="0"/>
-              <a:buChar char="•"/>
-              <a:defRPr sz="1800" kern="1200">
-                <a:solidFill>
-                  <a:schemeClr val="tx1"/>
-                </a:solidFill>
-                <a:latin typeface="+mn-lt"/>
-                <a:ea typeface="+mn-ea"/>
-                <a:cs typeface="+mn-cs"/>
-              </a:defRPr>
-            </a:lvl5pPr>
-            <a:lvl6pPr marL="2514600" indent="-228600" algn="l" defTabSz="914400" rtl="0" eaLnBrk="1" latinLnBrk="0" hangingPunct="1">
-              <a:lnSpc>
-                <a:spcPct val="90000"/>
-              </a:lnSpc>
-              <a:spcBef>
-                <a:spcPts val="500"/>
-              </a:spcBef>
-              <a:buFont typeface="Arial" panose="020B0604020202020204" pitchFamily="34" charset="0"/>
-              <a:buChar char="•"/>
-              <a:defRPr sz="1800" kern="1200">
-                <a:solidFill>
-                  <a:schemeClr val="tx1"/>
-                </a:solidFill>
-                <a:latin typeface="+mn-lt"/>
-                <a:ea typeface="+mn-ea"/>
-                <a:cs typeface="+mn-cs"/>
-              </a:defRPr>
-            </a:lvl6pPr>
-            <a:lvl7pPr marL="2971800" indent="-228600" algn="l" defTabSz="914400" rtl="0" eaLnBrk="1" latinLnBrk="0" hangingPunct="1">
-              <a:lnSpc>
-                <a:spcPct val="90000"/>
-              </a:lnSpc>
-              <a:spcBef>
-                <a:spcPts val="500"/>
-              </a:spcBef>
-              <a:buFont typeface="Arial" panose="020B0604020202020204" pitchFamily="34" charset="0"/>
-              <a:buChar char="•"/>
-              <a:defRPr sz="1800" kern="1200">
-                <a:solidFill>
-                  <a:schemeClr val="tx1"/>
-                </a:solidFill>
-                <a:latin typeface="+mn-lt"/>
-                <a:ea typeface="+mn-ea"/>
-                <a:cs typeface="+mn-cs"/>
-              </a:defRPr>
-            </a:lvl7pPr>
-            <a:lvl8pPr marL="3429000" indent="-228600" algn="l" defTabSz="914400" rtl="0" eaLnBrk="1" latinLnBrk="0" hangingPunct="1">
-              <a:lnSpc>
-                <a:spcPct val="90000"/>
-              </a:lnSpc>
-              <a:spcBef>
-                <a:spcPts val="500"/>
-              </a:spcBef>
-              <a:buFont typeface="Arial" panose="020B0604020202020204" pitchFamily="34" charset="0"/>
-              <a:buChar char="•"/>
-              <a:defRPr sz="1800" kern="1200">
-                <a:solidFill>
-                  <a:schemeClr val="tx1"/>
-                </a:solidFill>
-                <a:latin typeface="+mn-lt"/>
-                <a:ea typeface="+mn-ea"/>
-                <a:cs typeface="+mn-cs"/>
-              </a:defRPr>
-            </a:lvl8pPr>
-            <a:lvl9pPr marL="3886200" indent="-228600" algn="l" defTabSz="914400" rtl="0" eaLnBrk="1" latinLnBrk="0" hangingPunct="1">
-              <a:lnSpc>
-                <a:spcPct val="90000"/>
-              </a:lnSpc>
-              <a:spcBef>
-                <a:spcPts val="500"/>
-              </a:spcBef>
-              <a:buFont typeface="Arial" panose="020B0604020202020204" pitchFamily="34" charset="0"/>
-              <a:buChar char="•"/>
-              <a:defRPr sz="1800" kern="1200">
-                <a:solidFill>
-                  <a:schemeClr val="tx1"/>
-                </a:solidFill>
-                <a:latin typeface="+mn-lt"/>
-                <a:ea typeface="+mn-ea"/>
-                <a:cs typeface="+mn-cs"/>
-              </a:defRPr>
-            </a:lvl9pPr>
-          </a:lstStyle>
-          <a:p>
-            <a:pPr marL="0" indent="0">
-              <a:buNone/>
-            </a:pPr>
-            <a:r>
-              <a:rPr lang="en-US" sz="1200" b="1" dirty="0"/>
-              <a:t>Note:</a:t>
-            </a:r>
-            <a:r>
-              <a:rPr lang="en-US" sz="1200" dirty="0"/>
-              <a:t> The macros are stored in the corresponding .txt files. Make sure not to copy in the first and last line of the code. </a:t>
-            </a:r>
-          </a:p>
-        </p:txBody>
-      </p:sp>
-      <p:pic>
-        <p:nvPicPr>
-          <p:cNvPr id="11" name="Picture 10">
-            <a:extLst>
-              <a:ext uri="{FF2B5EF4-FFF2-40B4-BE49-F238E27FC236}">
-                <a16:creationId xmlns:a16="http://schemas.microsoft.com/office/drawing/2014/main" id="{FDADAA46-F1E9-4731-963F-7F7D2F20F77D}"/>
-              </a:ext>
-            </a:extLst>
-          </p:cNvPr>
-          <p:cNvPicPr>
-            <a:picLocks noChangeAspect="1"/>
-          </p:cNvPicPr>
-          <p:nvPr/>
-        </p:nvPicPr>
-        <p:blipFill>
-          <a:blip r:embed="rId3"/>
-          <a:stretch>
-            <a:fillRect/>
-          </a:stretch>
-        </p:blipFill>
-        <p:spPr>
-          <a:xfrm>
-            <a:off x="974160" y="1488803"/>
-            <a:ext cx="5048249" cy="2162856"/>
-          </a:xfrm>
-          <a:prstGeom prst="rect">
-            <a:avLst/>
-          </a:prstGeom>
-        </p:spPr>
-      </p:pic>
-      <p:sp>
-        <p:nvSpPr>
-          <p:cNvPr id="16" name="Text Placeholder 2">
-            <a:extLst>
-              <a:ext uri="{FF2B5EF4-FFF2-40B4-BE49-F238E27FC236}">
-                <a16:creationId xmlns:a16="http://schemas.microsoft.com/office/drawing/2014/main" id="{C5529CF9-DB6F-4D5B-A6C5-353500D88674}"/>
-              </a:ext>
-            </a:extLst>
-          </p:cNvPr>
-          <p:cNvSpPr txBox="1">
-            <a:spLocks/>
-          </p:cNvSpPr>
-          <p:nvPr/>
-        </p:nvSpPr>
-        <p:spPr>
-          <a:xfrm>
-            <a:off x="6904081" y="3162187"/>
-            <a:ext cx="4678139" cy="716732"/>
-          </a:xfrm>
-          <a:prstGeom prst="rect">
-            <a:avLst/>
-          </a:prstGeom>
-        </p:spPr>
-        <p:txBody>
-          <a:bodyPr>
-            <a:normAutofit/>
-          </a:bodyPr>
-          <a:lstStyle>
-            <a:lvl1pPr marL="228600" indent="-228600" algn="l" defTabSz="914400" rtl="0" eaLnBrk="1" latinLnBrk="0" hangingPunct="1">
-              <a:lnSpc>
-                <a:spcPct val="90000"/>
-              </a:lnSpc>
-              <a:spcBef>
-                <a:spcPts val="1000"/>
-              </a:spcBef>
-              <a:buFont typeface="Arial" panose="020B0604020202020204" pitchFamily="34" charset="0"/>
-              <a:buChar char="•"/>
-              <a:defRPr sz="2800" kern="1200">
-                <a:solidFill>
-                  <a:schemeClr val="tx1"/>
-                </a:solidFill>
-                <a:latin typeface="+mn-lt"/>
-                <a:ea typeface="+mn-ea"/>
-                <a:cs typeface="+mn-cs"/>
-              </a:defRPr>
-            </a:lvl1pPr>
-            <a:lvl2pPr marL="685800" indent="-228600" algn="l" defTabSz="914400" rtl="0" eaLnBrk="1" latinLnBrk="0" hangingPunct="1">
-              <a:lnSpc>
-                <a:spcPct val="90000"/>
-              </a:lnSpc>
-              <a:spcBef>
-                <a:spcPts val="500"/>
-              </a:spcBef>
-              <a:buFont typeface="Arial" panose="020B0604020202020204" pitchFamily="34" charset="0"/>
-              <a:buChar char="•"/>
-              <a:defRPr sz="2400" kern="1200">
-                <a:solidFill>
-                  <a:schemeClr val="tx1"/>
-                </a:solidFill>
-                <a:latin typeface="+mn-lt"/>
-                <a:ea typeface="+mn-ea"/>
-                <a:cs typeface="+mn-cs"/>
-              </a:defRPr>
-            </a:lvl2pPr>
-            <a:lvl3pPr marL="1143000" indent="-228600" algn="l" defTabSz="914400" rtl="0" eaLnBrk="1" latinLnBrk="0" hangingPunct="1">
-              <a:lnSpc>
-                <a:spcPct val="90000"/>
-              </a:lnSpc>
-              <a:spcBef>
-                <a:spcPts val="500"/>
-              </a:spcBef>
-              <a:buFont typeface="Arial" panose="020B0604020202020204" pitchFamily="34" charset="0"/>
-              <a:buChar char="•"/>
-              <a:defRPr sz="2000" kern="1200">
-                <a:solidFill>
-                  <a:schemeClr val="tx1"/>
-                </a:solidFill>
-                <a:latin typeface="+mn-lt"/>
-                <a:ea typeface="+mn-ea"/>
-                <a:cs typeface="+mn-cs"/>
-              </a:defRPr>
-            </a:lvl3pPr>
-            <a:lvl4pPr marL="1600200" indent="-228600" algn="l" defTabSz="914400" rtl="0" eaLnBrk="1" latinLnBrk="0" hangingPunct="1">
-              <a:lnSpc>
-                <a:spcPct val="90000"/>
-              </a:lnSpc>
-              <a:spcBef>
-                <a:spcPts val="500"/>
-              </a:spcBef>
-              <a:buFont typeface="Arial" panose="020B0604020202020204" pitchFamily="34" charset="0"/>
-              <a:buChar char="•"/>
-              <a:defRPr sz="1800" kern="1200">
-                <a:solidFill>
-                  <a:schemeClr val="tx1"/>
-                </a:solidFill>
-                <a:latin typeface="+mn-lt"/>
-                <a:ea typeface="+mn-ea"/>
-                <a:cs typeface="+mn-cs"/>
-              </a:defRPr>
-            </a:lvl4pPr>
-            <a:lvl5pPr marL="2057400" indent="-228600" algn="l" defTabSz="914400" rtl="0" eaLnBrk="1" latinLnBrk="0" hangingPunct="1">
-              <a:lnSpc>
-                <a:spcPct val="90000"/>
-              </a:lnSpc>
-              <a:spcBef>
-                <a:spcPts val="500"/>
-              </a:spcBef>
-              <a:buFont typeface="Arial" panose="020B0604020202020204" pitchFamily="34" charset="0"/>
-              <a:buChar char="•"/>
-              <a:defRPr sz="1800" kern="1200">
-                <a:solidFill>
-                  <a:schemeClr val="tx1"/>
-                </a:solidFill>
-                <a:latin typeface="+mn-lt"/>
-                <a:ea typeface="+mn-ea"/>
-                <a:cs typeface="+mn-cs"/>
-              </a:defRPr>
-            </a:lvl5pPr>
-            <a:lvl6pPr marL="2514600" indent="-228600" algn="l" defTabSz="914400" rtl="0" eaLnBrk="1" latinLnBrk="0" hangingPunct="1">
-              <a:lnSpc>
-                <a:spcPct val="90000"/>
-              </a:lnSpc>
-              <a:spcBef>
-                <a:spcPts val="500"/>
-              </a:spcBef>
-              <a:buFont typeface="Arial" panose="020B0604020202020204" pitchFamily="34" charset="0"/>
-              <a:buChar char="•"/>
-              <a:defRPr sz="1800" kern="1200">
-                <a:solidFill>
-                  <a:schemeClr val="tx1"/>
-                </a:solidFill>
-                <a:latin typeface="+mn-lt"/>
-                <a:ea typeface="+mn-ea"/>
-                <a:cs typeface="+mn-cs"/>
-              </a:defRPr>
-            </a:lvl6pPr>
-            <a:lvl7pPr marL="2971800" indent="-228600" algn="l" defTabSz="914400" rtl="0" eaLnBrk="1" latinLnBrk="0" hangingPunct="1">
-              <a:lnSpc>
-                <a:spcPct val="90000"/>
-              </a:lnSpc>
-              <a:spcBef>
-                <a:spcPts val="500"/>
-              </a:spcBef>
-              <a:buFont typeface="Arial" panose="020B0604020202020204" pitchFamily="34" charset="0"/>
-              <a:buChar char="•"/>
-              <a:defRPr sz="1800" kern="1200">
-                <a:solidFill>
-                  <a:schemeClr val="tx1"/>
-                </a:solidFill>
-                <a:latin typeface="+mn-lt"/>
-                <a:ea typeface="+mn-ea"/>
-                <a:cs typeface="+mn-cs"/>
-              </a:defRPr>
-            </a:lvl7pPr>
-            <a:lvl8pPr marL="3429000" indent="-228600" algn="l" defTabSz="914400" rtl="0" eaLnBrk="1" latinLnBrk="0" hangingPunct="1">
-              <a:lnSpc>
-                <a:spcPct val="90000"/>
-              </a:lnSpc>
-              <a:spcBef>
-                <a:spcPts val="500"/>
-              </a:spcBef>
-              <a:buFont typeface="Arial" panose="020B0604020202020204" pitchFamily="34" charset="0"/>
-              <a:buChar char="•"/>
-              <a:defRPr sz="1800" kern="1200">
-                <a:solidFill>
-                  <a:schemeClr val="tx1"/>
-                </a:solidFill>
-                <a:latin typeface="+mn-lt"/>
-                <a:ea typeface="+mn-ea"/>
-                <a:cs typeface="+mn-cs"/>
-              </a:defRPr>
-            </a:lvl8pPr>
-            <a:lvl9pPr marL="3886200" indent="-228600" algn="l" defTabSz="914400" rtl="0" eaLnBrk="1" latinLnBrk="0" hangingPunct="1">
-              <a:lnSpc>
-                <a:spcPct val="90000"/>
-              </a:lnSpc>
-              <a:spcBef>
-                <a:spcPts val="500"/>
-              </a:spcBef>
-              <a:buFont typeface="Arial" panose="020B0604020202020204" pitchFamily="34" charset="0"/>
-              <a:buChar char="•"/>
-              <a:defRPr sz="1800" kern="1200">
-                <a:solidFill>
-                  <a:schemeClr val="tx1"/>
-                </a:solidFill>
-                <a:latin typeface="+mn-lt"/>
-                <a:ea typeface="+mn-ea"/>
-                <a:cs typeface="+mn-cs"/>
-              </a:defRPr>
-            </a:lvl9pPr>
-          </a:lstStyle>
-          <a:p>
-            <a:pPr marL="0" indent="0">
-              <a:buNone/>
-            </a:pPr>
-            <a:r>
-              <a:rPr lang="en-US" sz="1200" b="1" dirty="0"/>
-              <a:t>Note:</a:t>
-            </a:r>
-            <a:r>
-              <a:rPr lang="en-US" sz="1200" dirty="0"/>
-              <a:t> To delete, just click on the bar on the bottom of each slide and select delete. </a:t>
-            </a:r>
-          </a:p>
-        </p:txBody>
-      </p:sp>
-    </p:spTree>
-    <p:extLst>
-      <p:ext uri="{BB962C8B-B14F-4D97-AF65-F5344CB8AC3E}">
-        <p14:creationId xmlns:p14="http://schemas.microsoft.com/office/powerpoint/2010/main" val="2888686709"/>
-      </p:ext>
-    </p:extLst>
-  </p:cSld>
-  <p:clrMapOvr>
-    <a:masterClrMapping/>
-  </p:clrMapOvr>
-</p:sld>
-</file>
-
-<file path=ppt/slides/slide5.xml><?xml version="1.0" encoding="utf-8"?>
-<p:sld xmlns:a="http://schemas.openxmlformats.org/drawingml/2006/main" xmlns:r="http://schemas.openxmlformats.org/officeDocument/2006/relationships" xmlns:p="http://schemas.openxmlformats.org/presentationml/2006/main">
-  <p:cSld>
-    <p:spTree>
-      <p:nvGrpSpPr>
-        <p:cNvPr id="1" name=""/>
-        <p:cNvGrpSpPr/>
-        <p:nvPr/>
-      </p:nvGrpSpPr>
-      <p:grpSpPr>
-        <a:xfrm>
-          <a:off x="0" y="0"/>
-          <a:ext cx="0" cy="0"/>
-          <a:chOff x="0" y="0"/>
-          <a:chExt cx="0" cy="0"/>
-        </a:xfrm>
-      </p:grpSpPr>
-      <p:sp>
-        <p:nvSpPr>
-          <p:cNvPr id="3" name="Title 1">
-            <a:extLst>
-              <a:ext uri="{FF2B5EF4-FFF2-40B4-BE49-F238E27FC236}">
-                <a16:creationId xmlns:a16="http://schemas.microsoft.com/office/drawing/2014/main" id="{2260366C-9CC9-4815-B6A0-B9386B0FC8C7}"/>
-              </a:ext>
-            </a:extLst>
-          </p:cNvPr>
-          <p:cNvSpPr txBox="1">
-            <a:spLocks/>
-          </p:cNvSpPr>
-          <p:nvPr/>
-        </p:nvSpPr>
-        <p:spPr>
-          <a:xfrm>
-            <a:off x="536189" y="567444"/>
-            <a:ext cx="10972440" cy="1144800"/>
-          </a:xfrm>
-          <a:prstGeom prst="rect">
-            <a:avLst/>
-          </a:prstGeom>
-        </p:spPr>
-        <p:txBody>
-          <a:bodyPr/>
-          <a:lstStyle>
-            <a:lvl1pPr algn="l" defTabSz="914400" rtl="0" eaLnBrk="1" latinLnBrk="0" hangingPunct="1">
-              <a:lnSpc>
-                <a:spcPct val="90000"/>
-              </a:lnSpc>
-              <a:spcBef>
-                <a:spcPct val="0"/>
-              </a:spcBef>
-              <a:buNone/>
-              <a:defRPr sz="4800" kern="1200">
-                <a:solidFill>
-                  <a:schemeClr val="tx1"/>
-                </a:solidFill>
-                <a:latin typeface="+mj-lt"/>
-                <a:ea typeface="+mj-ea"/>
-                <a:cs typeface="+mj-cs"/>
-              </a:defRPr>
-            </a:lvl1pPr>
-          </a:lstStyle>
-          <a:p>
-            <a:r>
-              <a:rPr lang="en-US" sz="3000" dirty="0"/>
-              <a:t>How to run Custom Macros</a:t>
-            </a:r>
-          </a:p>
-        </p:txBody>
-      </p:sp>
-      <p:sp>
-        <p:nvSpPr>
-          <p:cNvPr id="4" name="Text Placeholder 2">
-            <a:extLst>
-              <a:ext uri="{FF2B5EF4-FFF2-40B4-BE49-F238E27FC236}">
-                <a16:creationId xmlns:a16="http://schemas.microsoft.com/office/drawing/2014/main" id="{3B9600C4-DAE1-425A-9DAE-DB1914B17067}"/>
-              </a:ext>
-            </a:extLst>
-          </p:cNvPr>
-          <p:cNvSpPr txBox="1">
-            <a:spLocks/>
-          </p:cNvSpPr>
-          <p:nvPr/>
-        </p:nvSpPr>
-        <p:spPr>
-          <a:xfrm>
-            <a:off x="683371" y="1214762"/>
-            <a:ext cx="10972440" cy="594167"/>
-          </a:xfrm>
-          <a:prstGeom prst="rect">
-            <a:avLst/>
-          </a:prstGeom>
-        </p:spPr>
-        <p:txBody>
-          <a:bodyPr>
-            <a:normAutofit/>
-          </a:bodyPr>
-          <a:lstStyle>
-            <a:lvl1pPr marL="228600" indent="-228600" algn="l" defTabSz="914400" rtl="0" eaLnBrk="1" latinLnBrk="0" hangingPunct="1">
-              <a:lnSpc>
-                <a:spcPct val="90000"/>
-              </a:lnSpc>
-              <a:spcBef>
-                <a:spcPts val="1000"/>
-              </a:spcBef>
-              <a:buFont typeface="Arial" panose="020B0604020202020204" pitchFamily="34" charset="0"/>
-              <a:buChar char="•"/>
-              <a:defRPr sz="2800" kern="1200">
-                <a:solidFill>
-                  <a:schemeClr val="tx1"/>
-                </a:solidFill>
-                <a:latin typeface="+mn-lt"/>
-                <a:ea typeface="+mn-ea"/>
-                <a:cs typeface="+mn-cs"/>
-              </a:defRPr>
-            </a:lvl1pPr>
-            <a:lvl2pPr marL="685800" indent="-228600" algn="l" defTabSz="914400" rtl="0" eaLnBrk="1" latinLnBrk="0" hangingPunct="1">
-              <a:lnSpc>
-                <a:spcPct val="90000"/>
-              </a:lnSpc>
-              <a:spcBef>
-                <a:spcPts val="500"/>
-              </a:spcBef>
-              <a:buFont typeface="Arial" panose="020B0604020202020204" pitchFamily="34" charset="0"/>
-              <a:buChar char="•"/>
-              <a:defRPr sz="2400" kern="1200">
-                <a:solidFill>
-                  <a:schemeClr val="tx1"/>
-                </a:solidFill>
-                <a:latin typeface="+mn-lt"/>
-                <a:ea typeface="+mn-ea"/>
-                <a:cs typeface="+mn-cs"/>
-              </a:defRPr>
-            </a:lvl2pPr>
-            <a:lvl3pPr marL="1143000" indent="-228600" algn="l" defTabSz="914400" rtl="0" eaLnBrk="1" latinLnBrk="0" hangingPunct="1">
-              <a:lnSpc>
-                <a:spcPct val="90000"/>
-              </a:lnSpc>
-              <a:spcBef>
-                <a:spcPts val="500"/>
-              </a:spcBef>
-              <a:buFont typeface="Arial" panose="020B0604020202020204" pitchFamily="34" charset="0"/>
-              <a:buChar char="•"/>
-              <a:defRPr sz="2000" kern="1200">
-                <a:solidFill>
-                  <a:schemeClr val="tx1"/>
-                </a:solidFill>
-                <a:latin typeface="+mn-lt"/>
-                <a:ea typeface="+mn-ea"/>
-                <a:cs typeface="+mn-cs"/>
-              </a:defRPr>
-            </a:lvl3pPr>
-            <a:lvl4pPr marL="1600200" indent="-228600" algn="l" defTabSz="914400" rtl="0" eaLnBrk="1" latinLnBrk="0" hangingPunct="1">
-              <a:lnSpc>
-                <a:spcPct val="90000"/>
-              </a:lnSpc>
-              <a:spcBef>
-                <a:spcPts val="500"/>
-              </a:spcBef>
-              <a:buFont typeface="Arial" panose="020B0604020202020204" pitchFamily="34" charset="0"/>
-              <a:buChar char="•"/>
-              <a:defRPr sz="1800" kern="1200">
-                <a:solidFill>
-                  <a:schemeClr val="tx1"/>
-                </a:solidFill>
-                <a:latin typeface="+mn-lt"/>
-                <a:ea typeface="+mn-ea"/>
-                <a:cs typeface="+mn-cs"/>
-              </a:defRPr>
-            </a:lvl4pPr>
-            <a:lvl5pPr marL="2057400" indent="-228600" algn="l" defTabSz="914400" rtl="0" eaLnBrk="1" latinLnBrk="0" hangingPunct="1">
-              <a:lnSpc>
-                <a:spcPct val="90000"/>
-              </a:lnSpc>
-              <a:spcBef>
-                <a:spcPts val="500"/>
-              </a:spcBef>
-              <a:buFont typeface="Arial" panose="020B0604020202020204" pitchFamily="34" charset="0"/>
-              <a:buChar char="•"/>
-              <a:defRPr sz="1800" kern="1200">
-                <a:solidFill>
-                  <a:schemeClr val="tx1"/>
-                </a:solidFill>
-                <a:latin typeface="+mn-lt"/>
-                <a:ea typeface="+mn-ea"/>
-                <a:cs typeface="+mn-cs"/>
-              </a:defRPr>
-            </a:lvl5pPr>
-            <a:lvl6pPr marL="2514600" indent="-228600" algn="l" defTabSz="914400" rtl="0" eaLnBrk="1" latinLnBrk="0" hangingPunct="1">
-              <a:lnSpc>
-                <a:spcPct val="90000"/>
-              </a:lnSpc>
-              <a:spcBef>
-                <a:spcPts val="500"/>
-              </a:spcBef>
-              <a:buFont typeface="Arial" panose="020B0604020202020204" pitchFamily="34" charset="0"/>
-              <a:buChar char="•"/>
-              <a:defRPr sz="1800" kern="1200">
-                <a:solidFill>
-                  <a:schemeClr val="tx1"/>
-                </a:solidFill>
-                <a:latin typeface="+mn-lt"/>
-                <a:ea typeface="+mn-ea"/>
-                <a:cs typeface="+mn-cs"/>
-              </a:defRPr>
-            </a:lvl6pPr>
-            <a:lvl7pPr marL="2971800" indent="-228600" algn="l" defTabSz="914400" rtl="0" eaLnBrk="1" latinLnBrk="0" hangingPunct="1">
-              <a:lnSpc>
-                <a:spcPct val="90000"/>
-              </a:lnSpc>
-              <a:spcBef>
-                <a:spcPts val="500"/>
-              </a:spcBef>
-              <a:buFont typeface="Arial" panose="020B0604020202020204" pitchFamily="34" charset="0"/>
-              <a:buChar char="•"/>
-              <a:defRPr sz="1800" kern="1200">
-                <a:solidFill>
-                  <a:schemeClr val="tx1"/>
-                </a:solidFill>
-                <a:latin typeface="+mn-lt"/>
-                <a:ea typeface="+mn-ea"/>
-                <a:cs typeface="+mn-cs"/>
-              </a:defRPr>
-            </a:lvl7pPr>
-            <a:lvl8pPr marL="3429000" indent="-228600" algn="l" defTabSz="914400" rtl="0" eaLnBrk="1" latinLnBrk="0" hangingPunct="1">
-              <a:lnSpc>
-                <a:spcPct val="90000"/>
-              </a:lnSpc>
-              <a:spcBef>
-                <a:spcPts val="500"/>
-              </a:spcBef>
-              <a:buFont typeface="Arial" panose="020B0604020202020204" pitchFamily="34" charset="0"/>
-              <a:buChar char="•"/>
-              <a:defRPr sz="1800" kern="1200">
-                <a:solidFill>
-                  <a:schemeClr val="tx1"/>
-                </a:solidFill>
-                <a:latin typeface="+mn-lt"/>
-                <a:ea typeface="+mn-ea"/>
-                <a:cs typeface="+mn-cs"/>
-              </a:defRPr>
-            </a:lvl8pPr>
-            <a:lvl9pPr marL="3886200" indent="-228600" algn="l" defTabSz="914400" rtl="0" eaLnBrk="1" latinLnBrk="0" hangingPunct="1">
-              <a:lnSpc>
-                <a:spcPct val="90000"/>
-              </a:lnSpc>
-              <a:spcBef>
-                <a:spcPts val="500"/>
-              </a:spcBef>
-              <a:buFont typeface="Arial" panose="020B0604020202020204" pitchFamily="34" charset="0"/>
-              <a:buChar char="•"/>
-              <a:defRPr sz="1800" kern="1200">
-                <a:solidFill>
-                  <a:schemeClr val="tx1"/>
-                </a:solidFill>
-                <a:latin typeface="+mn-lt"/>
-                <a:ea typeface="+mn-ea"/>
-                <a:cs typeface="+mn-cs"/>
-              </a:defRPr>
-            </a:lvl9pPr>
-          </a:lstStyle>
-          <a:p>
-            <a:r>
-              <a:rPr lang="en-US" sz="1800" dirty="0"/>
-              <a:t>Taken from [https://www.howtogeek.com/709523/how-to-create-a-progress-bar-in-microsoft-powerpoint/]</a:t>
-            </a:r>
-          </a:p>
-        </p:txBody>
-      </p:sp>
-      <p:pic>
-        <p:nvPicPr>
-          <p:cNvPr id="5" name="Picture 4">
-            <a:extLst>
-              <a:ext uri="{FF2B5EF4-FFF2-40B4-BE49-F238E27FC236}">
-                <a16:creationId xmlns:a16="http://schemas.microsoft.com/office/drawing/2014/main" id="{7EB0CEFD-E7FD-4F72-80F3-83293175F7F4}"/>
-              </a:ext>
-            </a:extLst>
-          </p:cNvPr>
-          <p:cNvPicPr>
-            <a:picLocks noChangeAspect="1"/>
-          </p:cNvPicPr>
-          <p:nvPr/>
-        </p:nvPicPr>
-        <p:blipFill>
-          <a:blip r:embed="rId2"/>
-          <a:stretch>
-            <a:fillRect/>
-          </a:stretch>
-        </p:blipFill>
-        <p:spPr>
-          <a:xfrm>
-            <a:off x="302075" y="1847190"/>
-            <a:ext cx="4374134" cy="4147560"/>
-          </a:xfrm>
-          <a:prstGeom prst="rect">
-            <a:avLst/>
-          </a:prstGeom>
-        </p:spPr>
-      </p:pic>
-      <p:pic>
-        <p:nvPicPr>
-          <p:cNvPr id="6" name="Picture 5">
-            <a:extLst>
-              <a:ext uri="{FF2B5EF4-FFF2-40B4-BE49-F238E27FC236}">
-                <a16:creationId xmlns:a16="http://schemas.microsoft.com/office/drawing/2014/main" id="{362B06C7-9F67-44DF-9929-74DE251DEB91}"/>
-              </a:ext>
-            </a:extLst>
-          </p:cNvPr>
-          <p:cNvPicPr>
-            <a:picLocks noChangeAspect="1"/>
-          </p:cNvPicPr>
-          <p:nvPr/>
-        </p:nvPicPr>
-        <p:blipFill>
-          <a:blip r:embed="rId3"/>
-          <a:stretch>
-            <a:fillRect/>
-          </a:stretch>
-        </p:blipFill>
-        <p:spPr>
-          <a:xfrm>
-            <a:off x="4608146" y="1847190"/>
-            <a:ext cx="3445964" cy="3977280"/>
-          </a:xfrm>
-          <a:prstGeom prst="rect">
-            <a:avLst/>
-          </a:prstGeom>
-        </p:spPr>
-      </p:pic>
-      <p:pic>
-        <p:nvPicPr>
-          <p:cNvPr id="7" name="Picture 6">
-            <a:extLst>
-              <a:ext uri="{FF2B5EF4-FFF2-40B4-BE49-F238E27FC236}">
-                <a16:creationId xmlns:a16="http://schemas.microsoft.com/office/drawing/2014/main" id="{04B67B7B-2CBD-4036-AECA-959AC9E5E1DD}"/>
-              </a:ext>
-            </a:extLst>
-          </p:cNvPr>
-          <p:cNvPicPr>
-            <a:picLocks noChangeAspect="1"/>
-          </p:cNvPicPr>
-          <p:nvPr/>
-        </p:nvPicPr>
-        <p:blipFill>
-          <a:blip r:embed="rId4"/>
-          <a:stretch>
-            <a:fillRect/>
-          </a:stretch>
-        </p:blipFill>
-        <p:spPr>
-          <a:xfrm>
-            <a:off x="8091055" y="1750505"/>
-            <a:ext cx="3638647" cy="4609370"/>
-          </a:xfrm>
-          <a:prstGeom prst="rect">
-            <a:avLst/>
-          </a:prstGeom>
-        </p:spPr>
-      </p:pic>
-    </p:spTree>
-    <p:extLst>
-      <p:ext uri="{BB962C8B-B14F-4D97-AF65-F5344CB8AC3E}">
-        <p14:creationId xmlns:p14="http://schemas.microsoft.com/office/powerpoint/2010/main" val="4100427686"/>
-      </p:ext>
-    </p:extLst>
-  </p:cSld>
-  <p:clrMapOvr>
-    <a:masterClrMapping/>
-  </p:clrMapOvr>
-</p:sld>
-</file>
-
-<file path=ppt/slides/slide6.xml><?xml version="1.0" encoding="utf-8"?>
 <p:sld xmlns:a="http://schemas.openxmlformats.org/drawingml/2006/main" xmlns:r="http://schemas.openxmlformats.org/officeDocument/2006/relationships" xmlns:p="http://schemas.openxmlformats.org/presentationml/2006/main">
   <p:cSld>
     <p:spTree>

</xml_diff>